<commit_message>
Added article text, some code changes, BSNLP baseline
</commit_message>
<xml_diff>
--- a/control/First Control.pptx
+++ b/control/First Control.pptx
@@ -4,14 +4,20 @@
   <p:sldMasterIdLst>
     <p:sldMasterId id="2147483648" r:id="rId1"/>
   </p:sldMasterIdLst>
+  <p:notesMasterIdLst>
+    <p:notesMasterId r:id="rId12"/>
+  </p:notesMasterIdLst>
   <p:sldIdLst>
     <p:sldId id="256" r:id="rId2"/>
     <p:sldId id="257" r:id="rId3"/>
     <p:sldId id="258" r:id="rId4"/>
     <p:sldId id="259" r:id="rId5"/>
     <p:sldId id="260" r:id="rId6"/>
-    <p:sldId id="261" r:id="rId7"/>
-    <p:sldId id="262" r:id="rId8"/>
+    <p:sldId id="263" r:id="rId7"/>
+    <p:sldId id="267" r:id="rId8"/>
+    <p:sldId id="266" r:id="rId9"/>
+    <p:sldId id="261" r:id="rId10"/>
+    <p:sldId id="262" r:id="rId11"/>
   </p:sldIdLst>
   <p:sldSz cx="12192000" cy="6858000"/>
   <p:notesSz cx="6858000" cy="9144000"/>
@@ -122,6 +128,439 @@
 <p1510:revInfo xmlns:a="http://schemas.openxmlformats.org/drawingml/2006/main" xmlns:r="http://schemas.openxmlformats.org/officeDocument/2006/relationships" xmlns:p1510="http://schemas.microsoft.com/office/powerpoint/2015/10/main"/>
 </file>
 
+<file path=ppt/notesMasters/notesMaster1.xml><?xml version="1.0" encoding="utf-8"?>
+<p:notesMaster xmlns:a="http://schemas.openxmlformats.org/drawingml/2006/main" xmlns:r="http://schemas.openxmlformats.org/officeDocument/2006/relationships" xmlns:p="http://schemas.openxmlformats.org/presentationml/2006/main">
+  <p:cSld>
+    <p:bg>
+      <p:bgRef idx="1001">
+        <a:schemeClr val="bg1"/>
+      </p:bgRef>
+    </p:bg>
+    <p:spTree>
+      <p:nvGrpSpPr>
+        <p:cNvPr id="1" name=""/>
+        <p:cNvGrpSpPr/>
+        <p:nvPr/>
+      </p:nvGrpSpPr>
+      <p:grpSpPr>
+        <a:xfrm>
+          <a:off x="0" y="0"/>
+          <a:ext cx="0" cy="0"/>
+          <a:chOff x="0" y="0"/>
+          <a:chExt cx="0" cy="0"/>
+        </a:xfrm>
+      </p:grpSpPr>
+      <p:sp>
+        <p:nvSpPr>
+          <p:cNvPr id="2" name="Header Placeholder 1"/>
+          <p:cNvSpPr>
+            <a:spLocks noGrp="1"/>
+          </p:cNvSpPr>
+          <p:nvPr>
+            <p:ph type="hdr" sz="quarter"/>
+          </p:nvPr>
+        </p:nvSpPr>
+        <p:spPr>
+          <a:xfrm>
+            <a:off x="0" y="0"/>
+            <a:ext cx="2971800" cy="458788"/>
+          </a:xfrm>
+          <a:prstGeom prst="rect">
+            <a:avLst/>
+          </a:prstGeom>
+        </p:spPr>
+        <p:txBody>
+          <a:bodyPr vert="horz" lIns="91440" tIns="45720" rIns="91440" bIns="45720" rtlCol="0"/>
+          <a:lstStyle>
+            <a:lvl1pPr algn="l">
+              <a:defRPr sz="1200"/>
+            </a:lvl1pPr>
+          </a:lstStyle>
+          <a:p>
+            <a:endParaRPr lang="en-US"/>
+          </a:p>
+        </p:txBody>
+      </p:sp>
+      <p:sp>
+        <p:nvSpPr>
+          <p:cNvPr id="3" name="Date Placeholder 2"/>
+          <p:cNvSpPr>
+            <a:spLocks noGrp="1"/>
+          </p:cNvSpPr>
+          <p:nvPr>
+            <p:ph type="dt" idx="1"/>
+          </p:nvPr>
+        </p:nvSpPr>
+        <p:spPr>
+          <a:xfrm>
+            <a:off x="3884613" y="0"/>
+            <a:ext cx="2971800" cy="458788"/>
+          </a:xfrm>
+          <a:prstGeom prst="rect">
+            <a:avLst/>
+          </a:prstGeom>
+        </p:spPr>
+        <p:txBody>
+          <a:bodyPr vert="horz" lIns="91440" tIns="45720" rIns="91440" bIns="45720" rtlCol="0"/>
+          <a:lstStyle>
+            <a:lvl1pPr algn="r">
+              <a:defRPr sz="1200"/>
+            </a:lvl1pPr>
+          </a:lstStyle>
+          <a:p>
+            <a:fld id="{652E631F-D9ED-4C42-BDDB-CA9A8D11E41C}" type="datetimeFigureOut">
+              <a:rPr lang="en-US" smtClean="0"/>
+              <a:t>26-Nov-17</a:t>
+            </a:fld>
+            <a:endParaRPr lang="en-US"/>
+          </a:p>
+        </p:txBody>
+      </p:sp>
+      <p:sp>
+        <p:nvSpPr>
+          <p:cNvPr id="4" name="Slide Image Placeholder 3"/>
+          <p:cNvSpPr>
+            <a:spLocks noGrp="1" noRot="1" noChangeAspect="1"/>
+          </p:cNvSpPr>
+          <p:nvPr>
+            <p:ph type="sldImg" idx="2"/>
+          </p:nvPr>
+        </p:nvSpPr>
+        <p:spPr>
+          <a:xfrm>
+            <a:off x="685800" y="1143000"/>
+            <a:ext cx="5486400" cy="3086100"/>
+          </a:xfrm>
+          <a:prstGeom prst="rect">
+            <a:avLst/>
+          </a:prstGeom>
+          <a:noFill/>
+          <a:ln w="12700">
+            <a:solidFill>
+              <a:prstClr val="black"/>
+            </a:solidFill>
+          </a:ln>
+        </p:spPr>
+        <p:txBody>
+          <a:bodyPr vert="horz" lIns="91440" tIns="45720" rIns="91440" bIns="45720" rtlCol="0" anchor="ctr"/>
+          <a:lstStyle/>
+          <a:p>
+            <a:endParaRPr lang="en-US"/>
+          </a:p>
+        </p:txBody>
+      </p:sp>
+      <p:sp>
+        <p:nvSpPr>
+          <p:cNvPr id="5" name="Notes Placeholder 4"/>
+          <p:cNvSpPr>
+            <a:spLocks noGrp="1"/>
+          </p:cNvSpPr>
+          <p:nvPr>
+            <p:ph type="body" sz="quarter" idx="3"/>
+          </p:nvPr>
+        </p:nvSpPr>
+        <p:spPr>
+          <a:xfrm>
+            <a:off x="685800" y="4400550"/>
+            <a:ext cx="5486400" cy="3600450"/>
+          </a:xfrm>
+          <a:prstGeom prst="rect">
+            <a:avLst/>
+          </a:prstGeom>
+        </p:spPr>
+        <p:txBody>
+          <a:bodyPr vert="horz" lIns="91440" tIns="45720" rIns="91440" bIns="45720" rtlCol="0"/>
+          <a:lstStyle/>
+          <a:p>
+            <a:pPr lvl="0"/>
+            <a:r>
+              <a:rPr lang="en-US"/>
+              <a:t>Edit Master text styles</a:t>
+            </a:r>
+          </a:p>
+          <a:p>
+            <a:pPr lvl="1"/>
+            <a:r>
+              <a:rPr lang="en-US"/>
+              <a:t>Second level</a:t>
+            </a:r>
+          </a:p>
+          <a:p>
+            <a:pPr lvl="2"/>
+            <a:r>
+              <a:rPr lang="en-US"/>
+              <a:t>Third level</a:t>
+            </a:r>
+          </a:p>
+          <a:p>
+            <a:pPr lvl="3"/>
+            <a:r>
+              <a:rPr lang="en-US"/>
+              <a:t>Fourth level</a:t>
+            </a:r>
+          </a:p>
+          <a:p>
+            <a:pPr lvl="4"/>
+            <a:r>
+              <a:rPr lang="en-US"/>
+              <a:t>Fifth level</a:t>
+            </a:r>
+          </a:p>
+        </p:txBody>
+      </p:sp>
+      <p:sp>
+        <p:nvSpPr>
+          <p:cNvPr id="6" name="Footer Placeholder 5"/>
+          <p:cNvSpPr>
+            <a:spLocks noGrp="1"/>
+          </p:cNvSpPr>
+          <p:nvPr>
+            <p:ph type="ftr" sz="quarter" idx="4"/>
+          </p:nvPr>
+        </p:nvSpPr>
+        <p:spPr>
+          <a:xfrm>
+            <a:off x="0" y="8685213"/>
+            <a:ext cx="2971800" cy="458787"/>
+          </a:xfrm>
+          <a:prstGeom prst="rect">
+            <a:avLst/>
+          </a:prstGeom>
+        </p:spPr>
+        <p:txBody>
+          <a:bodyPr vert="horz" lIns="91440" tIns="45720" rIns="91440" bIns="45720" rtlCol="0" anchor="b"/>
+          <a:lstStyle>
+            <a:lvl1pPr algn="l">
+              <a:defRPr sz="1200"/>
+            </a:lvl1pPr>
+          </a:lstStyle>
+          <a:p>
+            <a:endParaRPr lang="en-US"/>
+          </a:p>
+        </p:txBody>
+      </p:sp>
+      <p:sp>
+        <p:nvSpPr>
+          <p:cNvPr id="7" name="Slide Number Placeholder 6"/>
+          <p:cNvSpPr>
+            <a:spLocks noGrp="1"/>
+          </p:cNvSpPr>
+          <p:nvPr>
+            <p:ph type="sldNum" sz="quarter" idx="5"/>
+          </p:nvPr>
+        </p:nvSpPr>
+        <p:spPr>
+          <a:xfrm>
+            <a:off x="3884613" y="8685213"/>
+            <a:ext cx="2971800" cy="458787"/>
+          </a:xfrm>
+          <a:prstGeom prst="rect">
+            <a:avLst/>
+          </a:prstGeom>
+        </p:spPr>
+        <p:txBody>
+          <a:bodyPr vert="horz" lIns="91440" tIns="45720" rIns="91440" bIns="45720" rtlCol="0" anchor="b"/>
+          <a:lstStyle>
+            <a:lvl1pPr algn="r">
+              <a:defRPr sz="1200"/>
+            </a:lvl1pPr>
+          </a:lstStyle>
+          <a:p>
+            <a:fld id="{94D1878B-29BD-4E04-A222-F58F4C92CE65}" type="slidenum">
+              <a:rPr lang="en-US" smtClean="0"/>
+              <a:t>‹#›</a:t>
+            </a:fld>
+            <a:endParaRPr lang="en-US"/>
+          </a:p>
+        </p:txBody>
+      </p:sp>
+    </p:spTree>
+    <p:extLst>
+      <p:ext uri="{BB962C8B-B14F-4D97-AF65-F5344CB8AC3E}">
+        <p14:creationId xmlns:p14="http://schemas.microsoft.com/office/powerpoint/2010/main" val="4164578773"/>
+      </p:ext>
+    </p:extLst>
+  </p:cSld>
+  <p:clrMap bg1="lt1" tx1="dk1" bg2="lt2" tx2="dk2" accent1="accent1" accent2="accent2" accent3="accent3" accent4="accent4" accent5="accent5" accent6="accent6" hlink="hlink" folHlink="folHlink"/>
+  <p:notesStyle>
+    <a:lvl1pPr marL="0" algn="l" defTabSz="914400" rtl="0" eaLnBrk="1" latinLnBrk="0" hangingPunct="1">
+      <a:defRPr sz="1200" kern="1200">
+        <a:solidFill>
+          <a:schemeClr val="tx1"/>
+        </a:solidFill>
+        <a:latin typeface="+mn-lt"/>
+        <a:ea typeface="+mn-ea"/>
+        <a:cs typeface="+mn-cs"/>
+      </a:defRPr>
+    </a:lvl1pPr>
+    <a:lvl2pPr marL="457200" algn="l" defTabSz="914400" rtl="0" eaLnBrk="1" latinLnBrk="0" hangingPunct="1">
+      <a:defRPr sz="1200" kern="1200">
+        <a:solidFill>
+          <a:schemeClr val="tx1"/>
+        </a:solidFill>
+        <a:latin typeface="+mn-lt"/>
+        <a:ea typeface="+mn-ea"/>
+        <a:cs typeface="+mn-cs"/>
+      </a:defRPr>
+    </a:lvl2pPr>
+    <a:lvl3pPr marL="914400" algn="l" defTabSz="914400" rtl="0" eaLnBrk="1" latinLnBrk="0" hangingPunct="1">
+      <a:defRPr sz="1200" kern="1200">
+        <a:solidFill>
+          <a:schemeClr val="tx1"/>
+        </a:solidFill>
+        <a:latin typeface="+mn-lt"/>
+        <a:ea typeface="+mn-ea"/>
+        <a:cs typeface="+mn-cs"/>
+      </a:defRPr>
+    </a:lvl3pPr>
+    <a:lvl4pPr marL="1371600" algn="l" defTabSz="914400" rtl="0" eaLnBrk="1" latinLnBrk="0" hangingPunct="1">
+      <a:defRPr sz="1200" kern="1200">
+        <a:solidFill>
+          <a:schemeClr val="tx1"/>
+        </a:solidFill>
+        <a:latin typeface="+mn-lt"/>
+        <a:ea typeface="+mn-ea"/>
+        <a:cs typeface="+mn-cs"/>
+      </a:defRPr>
+    </a:lvl4pPr>
+    <a:lvl5pPr marL="1828800" algn="l" defTabSz="914400" rtl="0" eaLnBrk="1" latinLnBrk="0" hangingPunct="1">
+      <a:defRPr sz="1200" kern="1200">
+        <a:solidFill>
+          <a:schemeClr val="tx1"/>
+        </a:solidFill>
+        <a:latin typeface="+mn-lt"/>
+        <a:ea typeface="+mn-ea"/>
+        <a:cs typeface="+mn-cs"/>
+      </a:defRPr>
+    </a:lvl5pPr>
+    <a:lvl6pPr marL="2286000" algn="l" defTabSz="914400" rtl="0" eaLnBrk="1" latinLnBrk="0" hangingPunct="1">
+      <a:defRPr sz="1200" kern="1200">
+        <a:solidFill>
+          <a:schemeClr val="tx1"/>
+        </a:solidFill>
+        <a:latin typeface="+mn-lt"/>
+        <a:ea typeface="+mn-ea"/>
+        <a:cs typeface="+mn-cs"/>
+      </a:defRPr>
+    </a:lvl6pPr>
+    <a:lvl7pPr marL="2743200" algn="l" defTabSz="914400" rtl="0" eaLnBrk="1" latinLnBrk="0" hangingPunct="1">
+      <a:defRPr sz="1200" kern="1200">
+        <a:solidFill>
+          <a:schemeClr val="tx1"/>
+        </a:solidFill>
+        <a:latin typeface="+mn-lt"/>
+        <a:ea typeface="+mn-ea"/>
+        <a:cs typeface="+mn-cs"/>
+      </a:defRPr>
+    </a:lvl7pPr>
+    <a:lvl8pPr marL="3200400" algn="l" defTabSz="914400" rtl="0" eaLnBrk="1" latinLnBrk="0" hangingPunct="1">
+      <a:defRPr sz="1200" kern="1200">
+        <a:solidFill>
+          <a:schemeClr val="tx1"/>
+        </a:solidFill>
+        <a:latin typeface="+mn-lt"/>
+        <a:ea typeface="+mn-ea"/>
+        <a:cs typeface="+mn-cs"/>
+      </a:defRPr>
+    </a:lvl8pPr>
+    <a:lvl9pPr marL="3657600" algn="l" defTabSz="914400" rtl="0" eaLnBrk="1" latinLnBrk="0" hangingPunct="1">
+      <a:defRPr sz="1200" kern="1200">
+        <a:solidFill>
+          <a:schemeClr val="tx1"/>
+        </a:solidFill>
+        <a:latin typeface="+mn-lt"/>
+        <a:ea typeface="+mn-ea"/>
+        <a:cs typeface="+mn-cs"/>
+      </a:defRPr>
+    </a:lvl9pPr>
+  </p:notesStyle>
+</p:notesMaster>
+</file>
+
+<file path=ppt/notesSlides/notesSlide1.xml><?xml version="1.0" encoding="utf-8"?>
+<p:notes xmlns:a="http://schemas.openxmlformats.org/drawingml/2006/main" xmlns:r="http://schemas.openxmlformats.org/officeDocument/2006/relationships" xmlns:p="http://schemas.openxmlformats.org/presentationml/2006/main">
+  <p:cSld>
+    <p:spTree>
+      <p:nvGrpSpPr>
+        <p:cNvPr id="1" name=""/>
+        <p:cNvGrpSpPr/>
+        <p:nvPr/>
+      </p:nvGrpSpPr>
+      <p:grpSpPr>
+        <a:xfrm>
+          <a:off x="0" y="0"/>
+          <a:ext cx="0" cy="0"/>
+          <a:chOff x="0" y="0"/>
+          <a:chExt cx="0" cy="0"/>
+        </a:xfrm>
+      </p:grpSpPr>
+      <p:sp>
+        <p:nvSpPr>
+          <p:cNvPr id="2" name="Slide Image Placeholder 1"/>
+          <p:cNvSpPr>
+            <a:spLocks noGrp="1" noRot="1" noChangeAspect="1"/>
+          </p:cNvSpPr>
+          <p:nvPr>
+            <p:ph type="sldImg"/>
+          </p:nvPr>
+        </p:nvSpPr>
+        <p:spPr/>
+      </p:sp>
+      <p:sp>
+        <p:nvSpPr>
+          <p:cNvPr id="3" name="Notes Placeholder 2"/>
+          <p:cNvSpPr>
+            <a:spLocks noGrp="1"/>
+          </p:cNvSpPr>
+          <p:nvPr>
+            <p:ph type="body" idx="1"/>
+          </p:nvPr>
+        </p:nvSpPr>
+        <p:spPr/>
+        <p:txBody>
+          <a:bodyPr/>
+          <a:lstStyle/>
+          <a:p>
+            <a:endParaRPr lang="en-US" dirty="0"/>
+          </a:p>
+        </p:txBody>
+      </p:sp>
+      <p:sp>
+        <p:nvSpPr>
+          <p:cNvPr id="4" name="Slide Number Placeholder 3"/>
+          <p:cNvSpPr>
+            <a:spLocks noGrp="1"/>
+          </p:cNvSpPr>
+          <p:nvPr>
+            <p:ph type="sldNum" sz="quarter" idx="10"/>
+          </p:nvPr>
+        </p:nvSpPr>
+        <p:spPr/>
+        <p:txBody>
+          <a:bodyPr/>
+          <a:lstStyle/>
+          <a:p>
+            <a:fld id="{94D1878B-29BD-4E04-A222-F58F4C92CE65}" type="slidenum">
+              <a:rPr lang="en-US" smtClean="0"/>
+              <a:t>3</a:t>
+            </a:fld>
+            <a:endParaRPr lang="en-US"/>
+          </a:p>
+        </p:txBody>
+      </p:sp>
+    </p:spTree>
+    <p:extLst>
+      <p:ext uri="{BB962C8B-B14F-4D97-AF65-F5344CB8AC3E}">
+        <p14:creationId xmlns:p14="http://schemas.microsoft.com/office/powerpoint/2010/main" val="2056037827"/>
+      </p:ext>
+    </p:extLst>
+  </p:cSld>
+  <p:clrMapOvr>
+    <a:masterClrMapping/>
+  </p:clrMapOvr>
+</p:notes>
+</file>
+
 <file path=ppt/slideLayouts/slideLayout1.xml><?xml version="1.0" encoding="utf-8"?>
 <p:sldLayout xmlns:a="http://schemas.openxmlformats.org/drawingml/2006/main" xmlns:r="http://schemas.openxmlformats.org/officeDocument/2006/relationships" xmlns:p="http://schemas.openxmlformats.org/presentationml/2006/main" type="title" preserve="1">
   <p:cSld name="Title Slide">
@@ -269,7 +708,7 @@
           <a:p>
             <a:fld id="{B11D0E9A-F31F-4A59-82D2-0D43B3059045}" type="datetimeFigureOut">
               <a:rPr lang="en-US" smtClean="0"/>
-              <a:t>19-Nov-17</a:t>
+              <a:t>26-Nov-17</a:t>
             </a:fld>
             <a:endParaRPr lang="en-US"/>
           </a:p>
@@ -467,7 +906,7 @@
           <a:p>
             <a:fld id="{B11D0E9A-F31F-4A59-82D2-0D43B3059045}" type="datetimeFigureOut">
               <a:rPr lang="en-US" smtClean="0"/>
-              <a:t>19-Nov-17</a:t>
+              <a:t>26-Nov-17</a:t>
             </a:fld>
             <a:endParaRPr lang="en-US"/>
           </a:p>
@@ -675,7 +1114,7 @@
           <a:p>
             <a:fld id="{B11D0E9A-F31F-4A59-82D2-0D43B3059045}" type="datetimeFigureOut">
               <a:rPr lang="en-US" smtClean="0"/>
-              <a:t>19-Nov-17</a:t>
+              <a:t>26-Nov-17</a:t>
             </a:fld>
             <a:endParaRPr lang="en-US"/>
           </a:p>
@@ -873,7 +1312,7 @@
           <a:p>
             <a:fld id="{B11D0E9A-F31F-4A59-82D2-0D43B3059045}" type="datetimeFigureOut">
               <a:rPr lang="en-US" smtClean="0"/>
-              <a:t>19-Nov-17</a:t>
+              <a:t>26-Nov-17</a:t>
             </a:fld>
             <a:endParaRPr lang="en-US"/>
           </a:p>
@@ -1148,7 +1587,7 @@
           <a:p>
             <a:fld id="{B11D0E9A-F31F-4A59-82D2-0D43B3059045}" type="datetimeFigureOut">
               <a:rPr lang="en-US" smtClean="0"/>
-              <a:t>19-Nov-17</a:t>
+              <a:t>26-Nov-17</a:t>
             </a:fld>
             <a:endParaRPr lang="en-US"/>
           </a:p>
@@ -1413,7 +1852,7 @@
           <a:p>
             <a:fld id="{B11D0E9A-F31F-4A59-82D2-0D43B3059045}" type="datetimeFigureOut">
               <a:rPr lang="en-US" smtClean="0"/>
-              <a:t>19-Nov-17</a:t>
+              <a:t>26-Nov-17</a:t>
             </a:fld>
             <a:endParaRPr lang="en-US"/>
           </a:p>
@@ -1825,7 +2264,7 @@
           <a:p>
             <a:fld id="{B11D0E9A-F31F-4A59-82D2-0D43B3059045}" type="datetimeFigureOut">
               <a:rPr lang="en-US" smtClean="0"/>
-              <a:t>19-Nov-17</a:t>
+              <a:t>26-Nov-17</a:t>
             </a:fld>
             <a:endParaRPr lang="en-US"/>
           </a:p>
@@ -1966,7 +2405,7 @@
           <a:p>
             <a:fld id="{B11D0E9A-F31F-4A59-82D2-0D43B3059045}" type="datetimeFigureOut">
               <a:rPr lang="en-US" smtClean="0"/>
-              <a:t>19-Nov-17</a:t>
+              <a:t>26-Nov-17</a:t>
             </a:fld>
             <a:endParaRPr lang="en-US"/>
           </a:p>
@@ -2079,7 +2518,7 @@
           <a:p>
             <a:fld id="{B11D0E9A-F31F-4A59-82D2-0D43B3059045}" type="datetimeFigureOut">
               <a:rPr lang="en-US" smtClean="0"/>
-              <a:t>19-Nov-17</a:t>
+              <a:t>26-Nov-17</a:t>
             </a:fld>
             <a:endParaRPr lang="en-US"/>
           </a:p>
@@ -2390,7 +2829,7 @@
           <a:p>
             <a:fld id="{B11D0E9A-F31F-4A59-82D2-0D43B3059045}" type="datetimeFigureOut">
               <a:rPr lang="en-US" smtClean="0"/>
-              <a:t>19-Nov-17</a:t>
+              <a:t>26-Nov-17</a:t>
             </a:fld>
             <a:endParaRPr lang="en-US"/>
           </a:p>
@@ -2678,7 +3117,7 @@
           <a:p>
             <a:fld id="{B11D0E9A-F31F-4A59-82D2-0D43B3059045}" type="datetimeFigureOut">
               <a:rPr lang="en-US" smtClean="0"/>
-              <a:t>19-Nov-17</a:t>
+              <a:t>26-Nov-17</a:t>
             </a:fld>
             <a:endParaRPr lang="en-US"/>
           </a:p>
@@ -2919,7 +3358,7 @@
           <a:p>
             <a:fld id="{B11D0E9A-F31F-4A59-82D2-0D43B3059045}" type="datetimeFigureOut">
               <a:rPr lang="en-US" smtClean="0"/>
-              <a:t>19-Nov-17</a:t>
+              <a:t>26-Nov-17</a:t>
             </a:fld>
             <a:endParaRPr lang="en-US"/>
           </a:p>
@@ -3693,6 +4132,473 @@
 </p:sld>
 </file>
 
+<file path=ppt/slides/slide10.xml><?xml version="1.0" encoding="utf-8"?>
+<p:sld xmlns:a="http://schemas.openxmlformats.org/drawingml/2006/main" xmlns:r="http://schemas.openxmlformats.org/officeDocument/2006/relationships" xmlns:p="http://schemas.openxmlformats.org/presentationml/2006/main">
+  <p:cSld>
+    <p:spTree>
+      <p:nvGrpSpPr>
+        <p:cNvPr id="1" name=""/>
+        <p:cNvGrpSpPr/>
+        <p:nvPr/>
+      </p:nvGrpSpPr>
+      <p:grpSpPr>
+        <a:xfrm>
+          <a:off x="0" y="0"/>
+          <a:ext cx="0" cy="0"/>
+          <a:chOff x="0" y="0"/>
+          <a:chExt cx="0" cy="0"/>
+        </a:xfrm>
+      </p:grpSpPr>
+      <p:sp>
+        <p:nvSpPr>
+          <p:cNvPr id="4" name="Rectangle 3">
+            <a:extLst>
+              <a:ext uri="{FF2B5EF4-FFF2-40B4-BE49-F238E27FC236}">
+                <a16:creationId xmlns:a16="http://schemas.microsoft.com/office/drawing/2014/main" id="{B95D1BC1-55D5-4970-97A8-5FA3E7ABB530}"/>
+              </a:ext>
+            </a:extLst>
+          </p:cNvPr>
+          <p:cNvSpPr/>
+          <p:nvPr/>
+        </p:nvSpPr>
+        <p:spPr>
+          <a:xfrm>
+            <a:off x="3193631" y="541375"/>
+            <a:ext cx="5860772" cy="923330"/>
+          </a:xfrm>
+          <a:prstGeom prst="rect">
+            <a:avLst/>
+          </a:prstGeom>
+          <a:noFill/>
+        </p:spPr>
+        <p:txBody>
+          <a:bodyPr wrap="none" lIns="91440" tIns="45720" rIns="91440" bIns="45720">
+            <a:spAutoFit/>
+          </a:bodyPr>
+          <a:lstStyle/>
+          <a:p>
+            <a:pPr algn="ctr"/>
+            <a:r>
+              <a:rPr lang="ru-RU" sz="5400" b="0" cap="none" spc="0" dirty="0">
+                <a:ln w="0"/>
+                <a:solidFill>
+                  <a:schemeClr val="tx1"/>
+                </a:solidFill>
+                <a:effectLst>
+                  <a:outerShdw blurRad="38100" dist="19050" dir="2700000" algn="tl" rotWithShape="0">
+                    <a:schemeClr val="dk1">
+                      <a:alpha val="40000"/>
+                    </a:schemeClr>
+                  </a:outerShdw>
+                </a:effectLst>
+              </a:rPr>
+              <a:t>Список литературы</a:t>
+            </a:r>
+            <a:endParaRPr lang="en-US" sz="5400" b="0" cap="none" spc="0" dirty="0">
+              <a:ln w="0"/>
+              <a:solidFill>
+                <a:schemeClr val="tx1"/>
+              </a:solidFill>
+              <a:effectLst>
+                <a:outerShdw blurRad="38100" dist="19050" dir="2700000" algn="tl" rotWithShape="0">
+                  <a:schemeClr val="dk1">
+                    <a:alpha val="40000"/>
+                  </a:schemeClr>
+                </a:outerShdw>
+              </a:effectLst>
+            </a:endParaRPr>
+          </a:p>
+        </p:txBody>
+      </p:sp>
+      <p:sp>
+        <p:nvSpPr>
+          <p:cNvPr id="2" name="Rectangle 1">
+            <a:extLst>
+              <a:ext uri="{FF2B5EF4-FFF2-40B4-BE49-F238E27FC236}">
+                <a16:creationId xmlns:a16="http://schemas.microsoft.com/office/drawing/2014/main" id="{4A3066C0-128A-4B1F-9016-5BCE586DAA19}"/>
+              </a:ext>
+            </a:extLst>
+          </p:cNvPr>
+          <p:cNvSpPr/>
+          <p:nvPr/>
+        </p:nvSpPr>
+        <p:spPr>
+          <a:xfrm>
+            <a:off x="3338791" y="1805206"/>
+            <a:ext cx="5514417" cy="954107"/>
+          </a:xfrm>
+          <a:prstGeom prst="rect">
+            <a:avLst/>
+          </a:prstGeom>
+        </p:spPr>
+        <p:txBody>
+          <a:bodyPr wrap="square">
+            <a:spAutoFit/>
+          </a:bodyPr>
+          <a:lstStyle/>
+          <a:p>
+            <a:r>
+              <a:rPr lang="en-US" sz="1400" dirty="0" err="1"/>
+              <a:t>Chieu</a:t>
+            </a:r>
+            <a:r>
+              <a:rPr lang="en-US" sz="1400" dirty="0"/>
+              <a:t>, H. L., and Ng, H. T. Named entity recognition</a:t>
+            </a:r>
+            <a:r>
+              <a:rPr lang="ru-RU" sz="1400" dirty="0"/>
+              <a:t> </a:t>
+            </a:r>
+            <a:r>
+              <a:rPr lang="en-US" sz="1400" dirty="0"/>
+              <a:t>with a maximum entropy approach. In Proceedings of</a:t>
+            </a:r>
+            <a:r>
+              <a:rPr lang="ru-RU" sz="1400" dirty="0"/>
+              <a:t> </a:t>
+            </a:r>
+            <a:r>
+              <a:rPr lang="en-US" sz="1400" dirty="0"/>
+              <a:t>the Seventh Conference on Natural Language Learning</a:t>
+            </a:r>
+            <a:r>
+              <a:rPr lang="ru-RU" sz="1400" dirty="0"/>
+              <a:t> </a:t>
+            </a:r>
+            <a:r>
+              <a:rPr lang="en-US" sz="1400" dirty="0"/>
+              <a:t>at HLT-NAACL 2003 - Volume 4 (Stroudsburg, PA,</a:t>
+            </a:r>
+            <a:r>
+              <a:rPr lang="ru-RU" sz="1400" dirty="0"/>
+              <a:t> </a:t>
+            </a:r>
+            <a:r>
+              <a:rPr lang="en-US" sz="1400" dirty="0"/>
+              <a:t>USA, 2003), CONLL ’03, Association for Computational</a:t>
+            </a:r>
+            <a:r>
+              <a:rPr lang="ru-RU" sz="1400" dirty="0"/>
+              <a:t> </a:t>
+            </a:r>
+            <a:r>
+              <a:rPr lang="en-US" sz="1400" dirty="0"/>
+              <a:t>Linguistics, pp. 160–163.</a:t>
+            </a:r>
+          </a:p>
+        </p:txBody>
+      </p:sp>
+      <p:sp>
+        <p:nvSpPr>
+          <p:cNvPr id="3" name="Rectangle 2">
+            <a:extLst>
+              <a:ext uri="{FF2B5EF4-FFF2-40B4-BE49-F238E27FC236}">
+                <a16:creationId xmlns:a16="http://schemas.microsoft.com/office/drawing/2014/main" id="{97500E18-11E6-4474-A43F-C588B1E6F529}"/>
+              </a:ext>
+            </a:extLst>
+          </p:cNvPr>
+          <p:cNvSpPr/>
+          <p:nvPr/>
+        </p:nvSpPr>
+        <p:spPr>
+          <a:xfrm>
+            <a:off x="3338791" y="3897922"/>
+            <a:ext cx="6096000" cy="523220"/>
+          </a:xfrm>
+          <a:prstGeom prst="rect">
+            <a:avLst/>
+          </a:prstGeom>
+        </p:spPr>
+        <p:txBody>
+          <a:bodyPr>
+            <a:spAutoFit/>
+          </a:bodyPr>
+          <a:lstStyle/>
+          <a:p>
+            <a:r>
+              <a:rPr lang="en-US" sz="1400" dirty="0"/>
+              <a:t>Chiu, J. P. C., and Nichols, E. Named entity recognition</a:t>
+            </a:r>
+            <a:r>
+              <a:rPr lang="ru-RU" sz="1400" dirty="0"/>
+              <a:t> </a:t>
+            </a:r>
+            <a:r>
+              <a:rPr lang="en-US" sz="1400" dirty="0"/>
+              <a:t>with bidirectional </a:t>
+            </a:r>
+            <a:r>
+              <a:rPr lang="en-US" sz="1400" dirty="0" err="1"/>
+              <a:t>lstm-cnns</a:t>
+            </a:r>
+            <a:r>
+              <a:rPr lang="en-US" sz="1400" dirty="0"/>
+              <a:t>. </a:t>
+            </a:r>
+            <a:r>
+              <a:rPr lang="en-US" sz="1400" dirty="0" err="1"/>
+              <a:t>CoRR</a:t>
+            </a:r>
+            <a:r>
+              <a:rPr lang="en-US" sz="1400" dirty="0"/>
+              <a:t> abs/1511.08308</a:t>
+            </a:r>
+            <a:r>
+              <a:rPr lang="ru-RU" sz="1400" dirty="0"/>
+              <a:t> </a:t>
+            </a:r>
+            <a:r>
+              <a:rPr lang="en-US" sz="1400" dirty="0"/>
+              <a:t>(2015).</a:t>
+            </a:r>
+          </a:p>
+        </p:txBody>
+      </p:sp>
+      <p:sp>
+        <p:nvSpPr>
+          <p:cNvPr id="5" name="Rectangle 4">
+            <a:extLst>
+              <a:ext uri="{FF2B5EF4-FFF2-40B4-BE49-F238E27FC236}">
+                <a16:creationId xmlns:a16="http://schemas.microsoft.com/office/drawing/2014/main" id="{A5312259-6FDB-4C73-B025-F230DFB06DBD}"/>
+              </a:ext>
+            </a:extLst>
+          </p:cNvPr>
+          <p:cNvSpPr/>
+          <p:nvPr/>
+        </p:nvSpPr>
+        <p:spPr>
+          <a:xfrm>
+            <a:off x="3338791" y="4513393"/>
+            <a:ext cx="6096000" cy="523220"/>
+          </a:xfrm>
+          <a:prstGeom prst="rect">
+            <a:avLst/>
+          </a:prstGeom>
+        </p:spPr>
+        <p:txBody>
+          <a:bodyPr>
+            <a:spAutoFit/>
+          </a:bodyPr>
+          <a:lstStyle/>
+          <a:p>
+            <a:r>
+              <a:rPr lang="en-US" sz="1400" dirty="0"/>
+              <a:t>Ma, X., and </a:t>
+            </a:r>
+            <a:r>
+              <a:rPr lang="en-US" sz="1400" dirty="0" err="1"/>
+              <a:t>Hovy</a:t>
+            </a:r>
+            <a:r>
+              <a:rPr lang="en-US" sz="1400" dirty="0"/>
+              <a:t>, E. H. End-to-end sequence labeling</a:t>
+            </a:r>
+            <a:r>
+              <a:rPr lang="ru-RU" sz="1400" dirty="0"/>
+              <a:t> </a:t>
+            </a:r>
+            <a:r>
+              <a:rPr lang="en-US" sz="1400" dirty="0"/>
+              <a:t>via bi-directional </a:t>
+            </a:r>
+            <a:r>
+              <a:rPr lang="en-US" sz="1400" dirty="0" err="1"/>
+              <a:t>lstm-cnns-crf</a:t>
+            </a:r>
+            <a:r>
+              <a:rPr lang="en-US" sz="1400" dirty="0"/>
+              <a:t>. </a:t>
+            </a:r>
+            <a:r>
+              <a:rPr lang="en-US" sz="1400" dirty="0" err="1"/>
+              <a:t>CoRR</a:t>
+            </a:r>
+            <a:r>
+              <a:rPr lang="en-US" sz="1400" dirty="0"/>
+              <a:t> abs/1603.01354</a:t>
+            </a:r>
+            <a:r>
+              <a:rPr lang="ru-RU" sz="1400" dirty="0"/>
+              <a:t> </a:t>
+            </a:r>
+            <a:r>
+              <a:rPr lang="en-US" sz="1400" dirty="0"/>
+              <a:t>(2016).</a:t>
+            </a:r>
+          </a:p>
+        </p:txBody>
+      </p:sp>
+      <p:sp>
+        <p:nvSpPr>
+          <p:cNvPr id="6" name="Rectangle 5">
+            <a:extLst>
+              <a:ext uri="{FF2B5EF4-FFF2-40B4-BE49-F238E27FC236}">
+                <a16:creationId xmlns:a16="http://schemas.microsoft.com/office/drawing/2014/main" id="{C7C8DF42-E1CF-4764-9C45-C9EE663D27CC}"/>
+              </a:ext>
+            </a:extLst>
+          </p:cNvPr>
+          <p:cNvSpPr/>
+          <p:nvPr/>
+        </p:nvSpPr>
+        <p:spPr>
+          <a:xfrm>
+            <a:off x="3338791" y="5128864"/>
+            <a:ext cx="6096000" cy="954107"/>
+          </a:xfrm>
+          <a:prstGeom prst="rect">
+            <a:avLst/>
+          </a:prstGeom>
+        </p:spPr>
+        <p:txBody>
+          <a:bodyPr>
+            <a:spAutoFit/>
+          </a:bodyPr>
+          <a:lstStyle/>
+          <a:p>
+            <a:r>
+              <a:rPr lang="en-US" sz="1400" dirty="0" err="1"/>
+              <a:t>Nothman</a:t>
+            </a:r>
+            <a:r>
+              <a:rPr lang="en-US" sz="1400" dirty="0"/>
+              <a:t>, J., Ringland, N., Radford, W., Murphy, T.,</a:t>
+            </a:r>
+            <a:r>
+              <a:rPr lang="ru-RU" sz="1400" dirty="0"/>
+              <a:t> </a:t>
+            </a:r>
+            <a:r>
+              <a:rPr lang="en-US" sz="1400" dirty="0"/>
+              <a:t>and Curran, J. R. Learning multilingual named entity</a:t>
+            </a:r>
+            <a:r>
+              <a:rPr lang="ru-RU" sz="1400" dirty="0"/>
+              <a:t> </a:t>
+            </a:r>
+            <a:r>
+              <a:rPr lang="en-US" sz="1400" dirty="0"/>
+              <a:t>recognition from </a:t>
+            </a:r>
+            <a:r>
+              <a:rPr lang="en-US" sz="1400" dirty="0" err="1"/>
+              <a:t>wikipedia</a:t>
+            </a:r>
+            <a:r>
+              <a:rPr lang="en-US" sz="1400" dirty="0"/>
+              <a:t>. Artiﬁcial Intelligence 194,</a:t>
+            </a:r>
+          </a:p>
+          <a:p>
+            <a:r>
+              <a:rPr lang="en-US" sz="1400" dirty="0"/>
+              <a:t>Supplement C (2013), 151 – 175. Artiﬁcial Intelligence,</a:t>
+            </a:r>
+            <a:r>
+              <a:rPr lang="ru-RU" sz="1400" dirty="0"/>
+              <a:t> </a:t>
+            </a:r>
+            <a:r>
+              <a:rPr lang="en-US" sz="1400" dirty="0"/>
+              <a:t>Wikipedia and Semi-Structured Resources.</a:t>
+            </a:r>
+          </a:p>
+        </p:txBody>
+      </p:sp>
+      <p:sp>
+        <p:nvSpPr>
+          <p:cNvPr id="7" name="Rectangle 6">
+            <a:extLst>
+              <a:ext uri="{FF2B5EF4-FFF2-40B4-BE49-F238E27FC236}">
+                <a16:creationId xmlns:a16="http://schemas.microsoft.com/office/drawing/2014/main" id="{1EBE7E78-6839-4686-8D27-97DD5526DF7D}"/>
+              </a:ext>
+            </a:extLst>
+          </p:cNvPr>
+          <p:cNvSpPr/>
+          <p:nvPr/>
+        </p:nvSpPr>
+        <p:spPr>
+          <a:xfrm>
+            <a:off x="3338791" y="2851564"/>
+            <a:ext cx="6096000" cy="954107"/>
+          </a:xfrm>
+          <a:prstGeom prst="rect">
+            <a:avLst/>
+          </a:prstGeom>
+        </p:spPr>
+        <p:txBody>
+          <a:bodyPr>
+            <a:spAutoFit/>
+          </a:bodyPr>
+          <a:lstStyle/>
+          <a:p>
+            <a:r>
+              <a:rPr lang="en-US" sz="1400" dirty="0"/>
+              <a:t>Florian, R., </a:t>
+            </a:r>
+            <a:r>
+              <a:rPr lang="en-US" sz="1400" dirty="0" err="1"/>
+              <a:t>Ittycheriah</a:t>
+            </a:r>
+            <a:r>
+              <a:rPr lang="en-US" sz="1400" dirty="0"/>
+              <a:t>, A., Jing, H., and Zhang, T.</a:t>
+            </a:r>
+            <a:r>
+              <a:rPr lang="ru-RU" sz="1400" dirty="0"/>
+              <a:t> </a:t>
+            </a:r>
+            <a:r>
+              <a:rPr lang="en-US" sz="1400" dirty="0"/>
+              <a:t>Named entity recognition through classiﬁer combination.</a:t>
+            </a:r>
+            <a:r>
+              <a:rPr lang="ru-RU" sz="1400" dirty="0"/>
+              <a:t> </a:t>
+            </a:r>
+            <a:r>
+              <a:rPr lang="en-US" sz="1400" dirty="0"/>
+              <a:t>In Proceedings of the Seventh Conference on Natural</a:t>
+            </a:r>
+            <a:r>
+              <a:rPr lang="ru-RU" sz="1400" dirty="0"/>
+              <a:t> </a:t>
+            </a:r>
+            <a:r>
+              <a:rPr lang="en-US" sz="1400" dirty="0"/>
+              <a:t>Language Learning at HLT-NAACL 2003 - Volume 4</a:t>
+            </a:r>
+            <a:r>
+              <a:rPr lang="ru-RU" sz="1400" dirty="0"/>
+              <a:t> </a:t>
+            </a:r>
+            <a:r>
+              <a:rPr lang="en-US" sz="1400" dirty="0"/>
+              <a:t>(Stroudsburg, PA, USA, 2003), CONLL ’03, Association</a:t>
+            </a:r>
+            <a:r>
+              <a:rPr lang="ru-RU" sz="1400" dirty="0"/>
+              <a:t> </a:t>
+            </a:r>
+            <a:r>
+              <a:rPr lang="en-US" sz="1400" dirty="0"/>
+              <a:t>for Computational Linguistics, pp. 168–171.</a:t>
+            </a:r>
+          </a:p>
+        </p:txBody>
+      </p:sp>
+    </p:spTree>
+    <p:extLst>
+      <p:ext uri="{BB962C8B-B14F-4D97-AF65-F5344CB8AC3E}">
+        <p14:creationId xmlns:p14="http://schemas.microsoft.com/office/powerpoint/2010/main" val="3581645244"/>
+      </p:ext>
+    </p:extLst>
+  </p:cSld>
+  <p:clrMapOvr>
+    <a:masterClrMapping/>
+  </p:clrMapOvr>
+</p:sld>
+</file>
+
 <file path=ppt/slides/slide2.xml><?xml version="1.0" encoding="utf-8"?>
 <p:sld xmlns:a="http://schemas.openxmlformats.org/drawingml/2006/main" xmlns:r="http://schemas.openxmlformats.org/officeDocument/2006/relationships" xmlns:p="http://schemas.openxmlformats.org/presentationml/2006/main">
   <p:cSld>
@@ -3935,8 +4841,8 @@
         </p:nvSpPr>
         <p:spPr>
           <a:xfrm>
-            <a:off x="2891124" y="2094042"/>
-            <a:ext cx="6954416" cy="3046988"/>
+            <a:off x="1979472" y="1782957"/>
+            <a:ext cx="8892382" cy="4154984"/>
           </a:xfrm>
           <a:prstGeom prst="rect">
             <a:avLst/>
@@ -3948,65 +4854,131 @@
           </a:bodyPr>
           <a:lstStyle/>
           <a:p>
+            <a:pPr marL="342900" indent="-342900">
+              <a:buFont typeface="Wingdings" panose="05000000000000000000" pitchFamily="2" charset="2"/>
+              <a:buChar char="ü"/>
+            </a:pPr>
+            <a:r>
+              <a:rPr lang="ru-RU" sz="2400" dirty="0">
+                <a:solidFill>
+                  <a:srgbClr val="00B050"/>
+                </a:solidFill>
+              </a:rPr>
+              <a:t>30 сентября – </a:t>
+            </a:r>
+            <a:r>
+              <a:rPr lang="en-US" sz="2400" dirty="0">
+                <a:solidFill>
+                  <a:srgbClr val="00B050"/>
+                </a:solidFill>
+              </a:rPr>
+              <a:t>NLTK, </a:t>
+            </a:r>
+            <a:r>
+              <a:rPr lang="ru-RU" sz="2400" dirty="0">
+                <a:solidFill>
+                  <a:srgbClr val="00B050"/>
+                </a:solidFill>
+              </a:rPr>
+              <a:t>обзор дорожек и работ</a:t>
+            </a:r>
+          </a:p>
+          <a:p>
+            <a:pPr marL="342900" indent="-342900">
+              <a:buFont typeface="Wingdings" panose="05000000000000000000" pitchFamily="2" charset="2"/>
+              <a:buChar char="ü"/>
+            </a:pPr>
+            <a:r>
+              <a:rPr lang="ru-RU" sz="2400" dirty="0">
+                <a:solidFill>
+                  <a:srgbClr val="00B050"/>
+                </a:solidFill>
+              </a:rPr>
+              <a:t>6 ноября – Генерация признаков</a:t>
+            </a:r>
+          </a:p>
+          <a:p>
+            <a:pPr marL="342900" indent="-342900">
+              <a:buFont typeface="Wingdings" panose="05000000000000000000" pitchFamily="2" charset="2"/>
+              <a:buChar char="ü"/>
+            </a:pPr>
+            <a:r>
+              <a:rPr lang="en-US" sz="2400" dirty="0">
+                <a:solidFill>
+                  <a:srgbClr val="00B050"/>
+                </a:solidFill>
+              </a:rPr>
+              <a:t>13 </a:t>
+            </a:r>
+            <a:r>
+              <a:rPr lang="ru-RU" sz="2400" dirty="0">
+                <a:solidFill>
+                  <a:srgbClr val="00B050"/>
+                </a:solidFill>
+              </a:rPr>
+              <a:t>ноября – Отбор признаков</a:t>
+            </a:r>
+            <a:endParaRPr lang="en-US" sz="2400" dirty="0">
+              <a:solidFill>
+                <a:srgbClr val="00B050"/>
+              </a:solidFill>
+            </a:endParaRPr>
+          </a:p>
+          <a:p>
+            <a:pPr marL="342900" indent="-342900">
+              <a:buFont typeface="Wingdings" panose="05000000000000000000" pitchFamily="2" charset="2"/>
+              <a:buChar char="ü"/>
+            </a:pPr>
+            <a:r>
+              <a:rPr lang="ru-RU" sz="2400" dirty="0">
+                <a:solidFill>
+                  <a:srgbClr val="00B050"/>
+                </a:solidFill>
+              </a:rPr>
+              <a:t>20 ноября – </a:t>
+            </a:r>
+            <a:r>
+              <a:rPr lang="en-US" sz="2400" dirty="0">
+                <a:solidFill>
+                  <a:srgbClr val="00B050"/>
+                </a:solidFill>
+              </a:rPr>
+              <a:t>Baseline</a:t>
+            </a:r>
+            <a:endParaRPr lang="ru-RU" sz="2400" dirty="0">
+              <a:solidFill>
+                <a:srgbClr val="00B050"/>
+              </a:solidFill>
+            </a:endParaRPr>
+          </a:p>
+          <a:p>
+            <a:pPr marL="342900" indent="-342900">
+              <a:buFont typeface="Arial" panose="020B0604020202020204" pitchFamily="34" charset="0"/>
+              <a:buChar char="•"/>
+            </a:pPr>
             <a:r>
               <a:rPr lang="ru-RU" sz="2400" dirty="0"/>
-              <a:t>30 сентября – </a:t>
-            </a:r>
-            <a:r>
-              <a:rPr lang="en-US" sz="2400" dirty="0"/>
-              <a:t>NLTK, </a:t>
-            </a:r>
+              <a:t>Ноябрь 2017 – Общий подбор параметров</a:t>
+            </a:r>
+          </a:p>
+          <a:p>
+            <a:pPr marL="342900" indent="-342900">
+              <a:buFont typeface="Arial" panose="020B0604020202020204" pitchFamily="34" charset="0"/>
+              <a:buChar char="•"/>
+            </a:pPr>
             <a:r>
               <a:rPr lang="ru-RU" sz="2400" dirty="0"/>
-              <a:t>обзор дорожек и работ</a:t>
-            </a:r>
-          </a:p>
-          <a:p>
+              <a:t>Декабрь 2017 – Глобальные признаки</a:t>
+            </a:r>
+          </a:p>
+          <a:p>
+            <a:pPr marL="342900" indent="-342900">
+              <a:buFont typeface="Arial" panose="020B0604020202020204" pitchFamily="34" charset="0"/>
+              <a:buChar char="•"/>
+            </a:pPr>
             <a:r>
               <a:rPr lang="ru-RU" sz="2400" dirty="0"/>
-              <a:t>6 ноября – Генерация признаков</a:t>
-            </a:r>
-          </a:p>
-          <a:p>
-            <a:r>
-              <a:rPr lang="en-US" sz="2400" dirty="0"/>
-              <a:t>13 </a:t>
-            </a:r>
-            <a:r>
-              <a:rPr lang="ru-RU" sz="2400" dirty="0"/>
-              <a:t>ноября – Отбор признаков</a:t>
-            </a:r>
-            <a:endParaRPr lang="en-US" sz="2400" dirty="0"/>
-          </a:p>
-          <a:p>
-            <a:r>
-              <a:rPr lang="ru-RU" sz="2400" dirty="0"/>
-              <a:t>20 ноября – </a:t>
-            </a:r>
-            <a:r>
-              <a:rPr lang="en-US" sz="2400" dirty="0"/>
-              <a:t>Baseline</a:t>
-            </a:r>
-            <a:endParaRPr lang="ru-RU" sz="2400" dirty="0"/>
-          </a:p>
-          <a:p>
-            <a:r>
-              <a:rPr lang="ru-RU" sz="2400" dirty="0"/>
-              <a:t>2</a:t>
-            </a:r>
-            <a:r>
-              <a:rPr lang="en-US" sz="2400" dirty="0"/>
-              <a:t>7 </a:t>
-            </a:r>
-            <a:r>
-              <a:rPr lang="ru-RU" sz="2400" dirty="0"/>
-              <a:t>ноября – Глобальные признаки</a:t>
-            </a:r>
-          </a:p>
-          <a:p>
-            <a:r>
-              <a:rPr lang="ru-RU" sz="2400" dirty="0"/>
-              <a:t>4 декабря – Подбор параметров для </a:t>
+              <a:t>Декабрь 2017 - Январь 2018 – Подбор параметров для </a:t>
             </a:r>
             <a:r>
               <a:rPr lang="en-US" sz="2400" dirty="0"/>
@@ -4014,9 +4986,13 @@
             </a:r>
           </a:p>
           <a:p>
+            <a:pPr marL="342900" indent="-342900">
+              <a:buFont typeface="Arial" panose="020B0604020202020204" pitchFamily="34" charset="0"/>
+              <a:buChar char="•"/>
+            </a:pPr>
             <a:r>
               <a:rPr lang="ru-RU" sz="2400" dirty="0"/>
-              <a:t>11 декабря – Подбор параметров для </a:t>
+              <a:t>Январь 2018 – Подбор параметров для </a:t>
             </a:r>
             <a:r>
               <a:rPr lang="en-US" sz="2400" dirty="0" err="1"/>
@@ -4025,11 +5001,34 @@
             <a:endParaRPr lang="ru-RU" sz="2400" dirty="0"/>
           </a:p>
           <a:p>
-            <a:r>
-              <a:rPr lang="ru-RU" sz="2400"/>
-              <a:t>…</a:t>
-            </a:r>
-            <a:endParaRPr lang="ru-RU" sz="2400" dirty="0"/>
+            <a:pPr marL="342900" indent="-342900">
+              <a:buFont typeface="Arial" panose="020B0604020202020204" pitchFamily="34" charset="0"/>
+              <a:buChar char="•"/>
+            </a:pPr>
+            <a:r>
+              <a:rPr lang="ru-RU" sz="2400" dirty="0"/>
+              <a:t>Февраль 2018 - статья на Диалог</a:t>
+            </a:r>
+          </a:p>
+          <a:p>
+            <a:pPr marL="342900" indent="-342900">
+              <a:buFont typeface="Arial" panose="020B0604020202020204" pitchFamily="34" charset="0"/>
+              <a:buChar char="•"/>
+            </a:pPr>
+            <a:r>
+              <a:rPr lang="ru-RU" sz="2400" dirty="0"/>
+              <a:t>Март 2018 - эксперименты с нейросетями</a:t>
+            </a:r>
+          </a:p>
+          <a:p>
+            <a:pPr marL="342900" indent="-342900">
+              <a:buFont typeface="Arial" panose="020B0604020202020204" pitchFamily="34" charset="0"/>
+              <a:buChar char="•"/>
+            </a:pPr>
+            <a:r>
+              <a:rPr lang="ru-RU" sz="2400" dirty="0"/>
+              <a:t>Апрель - Май 2018 - Диплом</a:t>
+            </a:r>
           </a:p>
         </p:txBody>
       </p:sp>
@@ -4206,8 +5205,8 @@
         </p:nvSpPr>
         <p:spPr>
           <a:xfrm>
-            <a:off x="2784418" y="550706"/>
-            <a:ext cx="6305958" cy="923330"/>
+            <a:off x="3995330" y="550706"/>
+            <a:ext cx="3884141" cy="923330"/>
           </a:xfrm>
           <a:prstGeom prst="rect">
             <a:avLst/>
@@ -4235,7 +5234,7 @@
                   </a:outerShdw>
                 </a:effectLst>
               </a:rPr>
-              <a:t>Проделанная работа</a:t>
+              <a:t>Обзор работ</a:t>
             </a:r>
             <a:endParaRPr lang="en-US" sz="5400" b="0" cap="none" spc="0" dirty="0">
               <a:ln w="0"/>
@@ -4267,8 +5266,8 @@
         </p:nvSpPr>
         <p:spPr>
           <a:xfrm>
-            <a:off x="1342116" y="1935566"/>
-            <a:ext cx="9159343" cy="4154984"/>
+            <a:off x="2206700" y="2256077"/>
+            <a:ext cx="7778600" cy="1938992"/>
           </a:xfrm>
           <a:prstGeom prst="rect">
             <a:avLst/>
@@ -4331,74 +5330,17 @@
               <a:rPr lang="en-US" sz="2400" dirty="0"/>
               <a:t>NER</a:t>
             </a:r>
-            <a:endParaRPr lang="ru-RU" sz="2400" dirty="0"/>
-          </a:p>
-          <a:p>
-            <a:pPr marL="342900" indent="-342900">
-              <a:buFont typeface="Arial" panose="020B0604020202020204" pitchFamily="34" charset="0"/>
-              <a:buChar char="•"/>
-            </a:pPr>
             <a:r>
               <a:rPr lang="ru-RU" sz="2400" dirty="0"/>
-              <a:t>Датасеты </a:t>
+              <a:t> (</a:t>
             </a:r>
             <a:r>
               <a:rPr lang="en-US" sz="2400" dirty="0"/>
-              <a:t>CoNLL2003, </a:t>
-            </a:r>
-            <a:r>
-              <a:rPr lang="en-US" sz="2400" dirty="0" err="1"/>
-              <a:t>FactRuEval</a:t>
-            </a:r>
-            <a:r>
-              <a:rPr lang="en-US" sz="2400" dirty="0"/>
-              <a:t>, BSNLP </a:t>
+              <a:t>HMM, CRF, </a:t>
             </a:r>
             <a:r>
               <a:rPr lang="ru-RU" sz="2400" dirty="0"/>
-              <a:t>приведены к одному формату </a:t>
-            </a:r>
-            <a:r>
-              <a:rPr lang="en-US" sz="2400" dirty="0"/>
-              <a:t>NLTK Corpus</a:t>
-            </a:r>
-          </a:p>
-          <a:p>
-            <a:pPr marL="342900" indent="-342900">
-              <a:buFont typeface="Arial" panose="020B0604020202020204" pitchFamily="34" charset="0"/>
-              <a:buChar char="•"/>
-            </a:pPr>
-            <a:r>
-              <a:rPr lang="ru-RU" sz="2400" dirty="0"/>
-              <a:t>Создан генератор признаков для рассматриваемых корпусов (пока что признаки базовые)</a:t>
-            </a:r>
-          </a:p>
-          <a:p>
-            <a:pPr marL="342900" indent="-342900">
-              <a:buFont typeface="Arial" panose="020B0604020202020204" pitchFamily="34" charset="0"/>
-              <a:buChar char="•"/>
-            </a:pPr>
-            <a:r>
-              <a:rPr lang="ru-RU" sz="2400" dirty="0"/>
-              <a:t>Произведен отбор признаков на основании частоты вхождения и весов, присвоенных классификатором</a:t>
-            </a:r>
-          </a:p>
-          <a:p>
-            <a:pPr marL="342900" indent="-342900">
-              <a:buFont typeface="Arial" panose="020B0604020202020204" pitchFamily="34" charset="0"/>
-              <a:buChar char="•"/>
-            </a:pPr>
-            <a:r>
-              <a:rPr lang="ru-RU" sz="2400" dirty="0"/>
-              <a:t>Получены </a:t>
-            </a:r>
-            <a:r>
-              <a:rPr lang="en-US" sz="2400" dirty="0"/>
-              <a:t>Baseline-</a:t>
-            </a:r>
-            <a:r>
-              <a:rPr lang="ru-RU" sz="2400" dirty="0"/>
-              <a:t>ы на всех корпусах для различных классификаторов</a:t>
+              <a:t>нейронные сети)</a:t>
             </a:r>
           </a:p>
         </p:txBody>
@@ -4447,8 +5389,8 @@
         </p:nvSpPr>
         <p:spPr>
           <a:xfrm>
-            <a:off x="3546096" y="541375"/>
-            <a:ext cx="5155835" cy="923330"/>
+            <a:off x="2545511" y="550706"/>
+            <a:ext cx="6783780" cy="923330"/>
           </a:xfrm>
           <a:prstGeom prst="rect">
             <a:avLst/>
@@ -4476,7 +5418,7 @@
                   </a:outerShdw>
                 </a:effectLst>
               </a:rPr>
-              <a:t>Текущие выводы</a:t>
+              <a:t>Выделение признаков</a:t>
             </a:r>
             <a:endParaRPr lang="en-US" sz="5400" b="0" cap="none" spc="0" dirty="0">
               <a:ln w="0"/>
@@ -4496,10 +5438,10 @@
       </p:sp>
       <p:sp>
         <p:nvSpPr>
-          <p:cNvPr id="3" name="Rectangle 2">
-            <a:extLst>
-              <a:ext uri="{FF2B5EF4-FFF2-40B4-BE49-F238E27FC236}">
-                <a16:creationId xmlns:a16="http://schemas.microsoft.com/office/drawing/2014/main" id="{83CF3ABD-E0CB-4311-B3FC-E50D25EBD6F2}"/>
+          <p:cNvPr id="5" name="Rectangle 4">
+            <a:extLst>
+              <a:ext uri="{FF2B5EF4-FFF2-40B4-BE49-F238E27FC236}">
+                <a16:creationId xmlns:a16="http://schemas.microsoft.com/office/drawing/2014/main" id="{89954452-BEF7-4794-AE07-64269161AB3C}"/>
               </a:ext>
             </a:extLst>
           </p:cNvPr>
@@ -4508,8 +5450,8 @@
         </p:nvSpPr>
         <p:spPr>
           <a:xfrm>
-            <a:off x="2646805" y="2058885"/>
-            <a:ext cx="6954416" cy="3785652"/>
+            <a:off x="1613555" y="1857080"/>
+            <a:ext cx="8964890" cy="4062651"/>
           </a:xfrm>
           <a:prstGeom prst="rect">
             <a:avLst/>
@@ -4527,20 +5469,17 @@
             </a:pPr>
             <a:r>
               <a:rPr lang="ru-RU" sz="2400" dirty="0"/>
-              <a:t>Самыми распространенными алгоритмами для решения задача </a:t>
+              <a:t>Датасеты приведены к форме </a:t>
             </a:r>
             <a:r>
               <a:rPr lang="en-US" sz="2400" dirty="0"/>
-              <a:t>NER </a:t>
+              <a:t>NLTK Corpus</a:t>
             </a:r>
             <a:r>
               <a:rPr lang="ru-RU" sz="2400" dirty="0"/>
-              <a:t>являются </a:t>
-            </a:r>
-            <a:r>
-              <a:rPr lang="en-US" sz="2400" dirty="0"/>
-              <a:t>HMM, CRF, CNN+BLSTN</a:t>
-            </a:r>
+              <a:t>, используется разбивка на слова в корпусе</a:t>
+            </a:r>
+            <a:endParaRPr lang="en-US" sz="2400" dirty="0"/>
           </a:p>
           <a:p>
             <a:pPr marL="342900" indent="-342900">
@@ -4549,8 +5488,96 @@
             </a:pPr>
             <a:r>
               <a:rPr lang="ru-RU" sz="2400" dirty="0"/>
-              <a:t>Ранее уже разрабатывались алгоритмы, использовавшие глобальный контекст, дальнейшие исследования можно основывать на соответствующих статьях</a:t>
-            </a:r>
+              <a:t>В качестве базовых признаков рассматриваются следующие</a:t>
+            </a:r>
+            <a:r>
+              <a:rPr lang="en-US" sz="2400" dirty="0"/>
+              <a:t>: </a:t>
+            </a:r>
+            <a:endParaRPr lang="ru-RU" sz="2400" dirty="0"/>
+          </a:p>
+          <a:p>
+            <a:pPr marL="914400" lvl="1" indent="-457200">
+              <a:buFont typeface="+mj-lt"/>
+              <a:buAutoNum type="arabicPeriod"/>
+            </a:pPr>
+            <a:r>
+              <a:rPr lang="ru-RU" dirty="0"/>
+              <a:t>Часть речи (</a:t>
+            </a:r>
+            <a:r>
+              <a:rPr lang="en-US" dirty="0"/>
+              <a:t>POS-tag, </a:t>
+            </a:r>
+            <a:r>
+              <a:rPr lang="ru-RU" dirty="0"/>
+              <a:t>для </a:t>
+            </a:r>
+            <a:r>
+              <a:rPr lang="en-US" dirty="0"/>
+              <a:t>CoNLL2003 </a:t>
+            </a:r>
+            <a:r>
+              <a:rPr lang="ru-RU" dirty="0"/>
+              <a:t>датасета - и </a:t>
+            </a:r>
+            <a:r>
+              <a:rPr lang="en-US" dirty="0"/>
+              <a:t>chunk-tag)</a:t>
+            </a:r>
+          </a:p>
+          <a:p>
+            <a:pPr marL="914400" lvl="1" indent="-457200">
+              <a:buFont typeface="+mj-lt"/>
+              <a:buAutoNum type="arabicPeriod"/>
+            </a:pPr>
+            <a:r>
+              <a:rPr lang="ru-RU" dirty="0"/>
+              <a:t>Капитализация (</a:t>
+            </a:r>
+            <a:r>
+              <a:rPr lang="en-US" dirty="0"/>
+              <a:t>normal-case, Proper-case</a:t>
+            </a:r>
+            <a:r>
+              <a:rPr lang="ru-RU" dirty="0"/>
+              <a:t>, </a:t>
+            </a:r>
+            <a:r>
+              <a:rPr lang="en-US" dirty="0"/>
+              <a:t>CAPITAL-case, Camel-case)</a:t>
+            </a:r>
+          </a:p>
+          <a:p>
+            <a:pPr marL="914400" lvl="1" indent="-457200">
+              <a:buFont typeface="+mj-lt"/>
+              <a:buAutoNum type="arabicPeriod"/>
+            </a:pPr>
+            <a:r>
+              <a:rPr lang="ru-RU" dirty="0"/>
+              <a:t>Флаг, является ли слово числом</a:t>
+            </a:r>
+          </a:p>
+          <a:p>
+            <a:pPr marL="914400" lvl="1" indent="-457200">
+              <a:buFont typeface="+mj-lt"/>
+              <a:buAutoNum type="arabicPeriod"/>
+            </a:pPr>
+            <a:r>
+              <a:rPr lang="ru-RU" dirty="0"/>
+              <a:t>Флаг, является ли слово знаком пунктуации</a:t>
+            </a:r>
+          </a:p>
+          <a:p>
+            <a:pPr marL="914400" lvl="1" indent="-457200">
+              <a:buFont typeface="+mj-lt"/>
+              <a:buAutoNum type="arabicPeriod"/>
+            </a:pPr>
+            <a:r>
+              <a:rPr lang="ru-RU" dirty="0"/>
+              <a:t>Начальная форма слова</a:t>
+            </a:r>
+            <a:endParaRPr lang="en-US" dirty="0"/>
           </a:p>
           <a:p>
             <a:pPr marL="342900" indent="-342900">
@@ -4559,35 +5586,53 @@
             </a:pPr>
             <a:r>
               <a:rPr lang="ru-RU" sz="2400" dirty="0"/>
-              <a:t>Из </a:t>
+              <a:t>Для приведения к начальной форме и </a:t>
             </a:r>
             <a:r>
               <a:rPr lang="en-US" sz="2400" dirty="0"/>
-              <a:t>“</a:t>
+              <a:t>POS</a:t>
             </a:r>
             <a:r>
               <a:rPr lang="ru-RU" sz="2400" dirty="0"/>
-              <a:t>обычных</a:t>
+              <a:t>-тегов используется </a:t>
             </a:r>
             <a:r>
               <a:rPr lang="en-US" sz="2400" dirty="0"/>
-              <a:t>”</a:t>
+              <a:t>pymorphy2</a:t>
             </a:r>
             <a:r>
               <a:rPr lang="ru-RU" sz="2400" dirty="0"/>
-              <a:t> классификаторов лучше справляются </a:t>
+              <a:t>, </a:t>
             </a:r>
             <a:r>
               <a:rPr lang="en-US" sz="2400" dirty="0" err="1"/>
-              <a:t>LogisticRegression</a:t>
+              <a:t>nltk</a:t>
             </a:r>
             <a:r>
               <a:rPr lang="en-US" sz="2400" dirty="0"/>
-              <a:t>, SVM, </a:t>
+              <a:t> </a:t>
             </a:r>
             <a:r>
               <a:rPr lang="ru-RU" sz="2400" dirty="0"/>
-              <a:t>алгоритмы на деревьях от них отстают</a:t>
+              <a:t>или же данные датасета</a:t>
+            </a:r>
+          </a:p>
+          <a:p>
+            <a:pPr marL="342900" indent="-342900">
+              <a:buFont typeface="Arial" panose="020B0604020202020204" pitchFamily="34" charset="0"/>
+              <a:buChar char="•"/>
+            </a:pPr>
+            <a:r>
+              <a:rPr lang="ru-RU" sz="2400" dirty="0"/>
+              <a:t>Признаки из всех вхождений будут добавлены позже – не используем для </a:t>
+            </a:r>
+            <a:r>
+              <a:rPr lang="en-US" sz="2400" dirty="0"/>
+              <a:t>baseline-</a:t>
+            </a:r>
+            <a:r>
+              <a:rPr lang="ru-RU" sz="2400" dirty="0"/>
+              <a:t>а</a:t>
             </a:r>
           </a:p>
         </p:txBody>
@@ -4595,7 +5640,7 @@
     </p:spTree>
     <p:extLst>
       <p:ext uri="{BB962C8B-B14F-4D97-AF65-F5344CB8AC3E}">
-        <p14:creationId xmlns:p14="http://schemas.microsoft.com/office/powerpoint/2010/main" val="51516451"/>
+        <p14:creationId xmlns:p14="http://schemas.microsoft.com/office/powerpoint/2010/main" val="4141969999"/>
       </p:ext>
     </p:extLst>
   </p:cSld>
@@ -4636,8 +5681,326 @@
         </p:nvSpPr>
         <p:spPr>
           <a:xfrm>
-            <a:off x="3193631" y="541375"/>
-            <a:ext cx="5860772" cy="923330"/>
+            <a:off x="3227226" y="720389"/>
+            <a:ext cx="5269520" cy="923330"/>
+          </a:xfrm>
+          <a:prstGeom prst="rect">
+            <a:avLst/>
+          </a:prstGeom>
+          <a:noFill/>
+        </p:spPr>
+        <p:txBody>
+          <a:bodyPr wrap="none" lIns="91440" tIns="45720" rIns="91440" bIns="45720">
+            <a:spAutoFit/>
+          </a:bodyPr>
+          <a:lstStyle/>
+          <a:p>
+            <a:pPr algn="ctr"/>
+            <a:r>
+              <a:rPr lang="ru-RU" sz="5400" dirty="0">
+                <a:ln w="0"/>
+                <a:effectLst>
+                  <a:outerShdw blurRad="38100" dist="19050" dir="2700000" algn="tl" rotWithShape="0">
+                    <a:schemeClr val="dk1">
+                      <a:alpha val="40000"/>
+                    </a:schemeClr>
+                  </a:outerShdw>
+                </a:effectLst>
+              </a:rPr>
+              <a:t>Отбор признаков</a:t>
+            </a:r>
+            <a:endParaRPr lang="en-US" sz="5400" b="0" cap="none" spc="0" dirty="0">
+              <a:ln w="0"/>
+              <a:solidFill>
+                <a:schemeClr val="tx1"/>
+              </a:solidFill>
+              <a:effectLst>
+                <a:outerShdw blurRad="38100" dist="19050" dir="2700000" algn="tl" rotWithShape="0">
+                  <a:schemeClr val="dk1">
+                    <a:alpha val="40000"/>
+                  </a:schemeClr>
+                </a:outerShdw>
+              </a:effectLst>
+            </a:endParaRPr>
+          </a:p>
+        </p:txBody>
+      </p:sp>
+      <p:sp>
+        <p:nvSpPr>
+          <p:cNvPr id="6" name="Rectangle 5">
+            <a:extLst>
+              <a:ext uri="{FF2B5EF4-FFF2-40B4-BE49-F238E27FC236}">
+                <a16:creationId xmlns:a16="http://schemas.microsoft.com/office/drawing/2014/main" id="{A324F3E4-9A7E-455C-9C60-021B1CC3FABC}"/>
+              </a:ext>
+            </a:extLst>
+          </p:cNvPr>
+          <p:cNvSpPr/>
+          <p:nvPr/>
+        </p:nvSpPr>
+        <p:spPr>
+          <a:xfrm>
+            <a:off x="2719422" y="2459504"/>
+            <a:ext cx="6954416" cy="1938992"/>
+          </a:xfrm>
+          <a:prstGeom prst="rect">
+            <a:avLst/>
+          </a:prstGeom>
+        </p:spPr>
+        <p:txBody>
+          <a:bodyPr wrap="square">
+            <a:spAutoFit/>
+          </a:bodyPr>
+          <a:lstStyle/>
+          <a:p>
+            <a:pPr marL="342900" indent="-342900">
+              <a:buFont typeface="Arial" panose="020B0604020202020204" pitchFamily="34" charset="0"/>
+              <a:buChar char="•"/>
+            </a:pPr>
+            <a:r>
+              <a:rPr lang="ru-RU" sz="2400" dirty="0"/>
+              <a:t>По частоте вхождения в датасет</a:t>
+            </a:r>
+            <a:r>
+              <a:rPr lang="en-US" sz="2400" dirty="0"/>
+              <a:t> (</a:t>
+            </a:r>
+            <a:r>
+              <a:rPr lang="ru-RU" sz="2400" dirty="0"/>
+              <a:t>если менее 5 вхождений – отбрасываем признак)</a:t>
+            </a:r>
+          </a:p>
+          <a:p>
+            <a:pPr marL="342900" indent="-342900">
+              <a:buFont typeface="Arial" panose="020B0604020202020204" pitchFamily="34" charset="0"/>
+              <a:buChar char="•"/>
+            </a:pPr>
+            <a:r>
+              <a:rPr lang="ru-RU" sz="2400" dirty="0"/>
+              <a:t>По весам классификатора (90 процентов)</a:t>
+            </a:r>
+          </a:p>
+          <a:p>
+            <a:r>
+              <a:rPr lang="ru-RU" sz="2400" dirty="0"/>
+              <a:t>В результате – сокращение признакового пространства с 27.000 до 700 признаков</a:t>
+            </a:r>
+          </a:p>
+        </p:txBody>
+      </p:sp>
+    </p:spTree>
+    <p:extLst>
+      <p:ext uri="{BB962C8B-B14F-4D97-AF65-F5344CB8AC3E}">
+        <p14:creationId xmlns:p14="http://schemas.microsoft.com/office/powerpoint/2010/main" val="1766075067"/>
+      </p:ext>
+    </p:extLst>
+  </p:cSld>
+  <p:clrMapOvr>
+    <a:masterClrMapping/>
+  </p:clrMapOvr>
+</p:sld>
+</file>
+
+<file path=ppt/slides/slide8.xml><?xml version="1.0" encoding="utf-8"?>
+<p:sld xmlns:a="http://schemas.openxmlformats.org/drawingml/2006/main" xmlns:r="http://schemas.openxmlformats.org/officeDocument/2006/relationships" xmlns:p="http://schemas.openxmlformats.org/presentationml/2006/main">
+  <p:cSld>
+    <p:spTree>
+      <p:nvGrpSpPr>
+        <p:cNvPr id="1" name=""/>
+        <p:cNvGrpSpPr/>
+        <p:nvPr/>
+      </p:nvGrpSpPr>
+      <p:grpSpPr>
+        <a:xfrm>
+          <a:off x="0" y="0"/>
+          <a:ext cx="0" cy="0"/>
+          <a:chOff x="0" y="0"/>
+          <a:chExt cx="0" cy="0"/>
+        </a:xfrm>
+      </p:grpSpPr>
+      <p:sp>
+        <p:nvSpPr>
+          <p:cNvPr id="4" name="Rectangle 3">
+            <a:extLst>
+              <a:ext uri="{FF2B5EF4-FFF2-40B4-BE49-F238E27FC236}">
+                <a16:creationId xmlns:a16="http://schemas.microsoft.com/office/drawing/2014/main" id="{B95D1BC1-55D5-4970-97A8-5FA3E7ABB530}"/>
+              </a:ext>
+            </a:extLst>
+          </p:cNvPr>
+          <p:cNvSpPr/>
+          <p:nvPr/>
+        </p:nvSpPr>
+        <p:spPr>
+          <a:xfrm>
+            <a:off x="4850021" y="257636"/>
+            <a:ext cx="2534669" cy="923330"/>
+          </a:xfrm>
+          <a:prstGeom prst="rect">
+            <a:avLst/>
+          </a:prstGeom>
+          <a:noFill/>
+        </p:spPr>
+        <p:txBody>
+          <a:bodyPr wrap="none" lIns="91440" tIns="45720" rIns="91440" bIns="45720">
+            <a:spAutoFit/>
+          </a:bodyPr>
+          <a:lstStyle/>
+          <a:p>
+            <a:pPr algn="ctr"/>
+            <a:r>
+              <a:rPr lang="en-US" sz="5400" b="0" cap="none" spc="0" dirty="0">
+                <a:ln w="0"/>
+                <a:solidFill>
+                  <a:schemeClr val="tx1"/>
+                </a:solidFill>
+                <a:effectLst>
+                  <a:outerShdw blurRad="38100" dist="19050" dir="2700000" algn="tl" rotWithShape="0">
+                    <a:schemeClr val="dk1">
+                      <a:alpha val="40000"/>
+                    </a:schemeClr>
+                  </a:outerShdw>
+                </a:effectLst>
+              </a:rPr>
+              <a:t>Baseline</a:t>
+            </a:r>
+          </a:p>
+        </p:txBody>
+      </p:sp>
+      <p:pic>
+        <p:nvPicPr>
+          <p:cNvPr id="6" name="Picture 5">
+            <a:extLst>
+              <a:ext uri="{FF2B5EF4-FFF2-40B4-BE49-F238E27FC236}">
+                <a16:creationId xmlns:a16="http://schemas.microsoft.com/office/drawing/2014/main" id="{04FF69BA-AAEC-4FB6-87DD-BF987A16A98C}"/>
+              </a:ext>
+            </a:extLst>
+          </p:cNvPr>
+          <p:cNvPicPr>
+            <a:picLocks noChangeAspect="1"/>
+          </p:cNvPicPr>
+          <p:nvPr/>
+        </p:nvPicPr>
+        <p:blipFill>
+          <a:blip r:embed="rId2"/>
+          <a:stretch>
+            <a:fillRect/>
+          </a:stretch>
+        </p:blipFill>
+        <p:spPr>
+          <a:xfrm>
+            <a:off x="1072119" y="1661765"/>
+            <a:ext cx="5023881" cy="4145146"/>
+          </a:xfrm>
+          <a:prstGeom prst="rect">
+            <a:avLst/>
+          </a:prstGeom>
+        </p:spPr>
+      </p:pic>
+      <p:pic>
+        <p:nvPicPr>
+          <p:cNvPr id="8" name="Picture 7">
+            <a:extLst>
+              <a:ext uri="{FF2B5EF4-FFF2-40B4-BE49-F238E27FC236}">
+                <a16:creationId xmlns:a16="http://schemas.microsoft.com/office/drawing/2014/main" id="{01BCC8CA-64A0-4717-8415-4E03E88A08EE}"/>
+              </a:ext>
+            </a:extLst>
+          </p:cNvPr>
+          <p:cNvPicPr>
+            <a:picLocks noChangeAspect="1"/>
+          </p:cNvPicPr>
+          <p:nvPr/>
+        </p:nvPicPr>
+        <p:blipFill>
+          <a:blip r:embed="rId3"/>
+          <a:stretch>
+            <a:fillRect/>
+          </a:stretch>
+        </p:blipFill>
+        <p:spPr>
+          <a:xfrm>
+            <a:off x="6542765" y="1548458"/>
+            <a:ext cx="4577116" cy="2083451"/>
+          </a:xfrm>
+          <a:prstGeom prst="rect">
+            <a:avLst/>
+          </a:prstGeom>
+        </p:spPr>
+      </p:pic>
+      <p:pic>
+        <p:nvPicPr>
+          <p:cNvPr id="9" name="Picture 8">
+            <a:extLst>
+              <a:ext uri="{FF2B5EF4-FFF2-40B4-BE49-F238E27FC236}">
+                <a16:creationId xmlns:a16="http://schemas.microsoft.com/office/drawing/2014/main" id="{4FFF3B5A-21D7-4B66-BAA0-38C7CE3FF787}"/>
+              </a:ext>
+            </a:extLst>
+          </p:cNvPr>
+          <p:cNvPicPr>
+            <a:picLocks noChangeAspect="1"/>
+          </p:cNvPicPr>
+          <p:nvPr/>
+        </p:nvPicPr>
+        <p:blipFill>
+          <a:blip r:embed="rId4"/>
+          <a:stretch>
+            <a:fillRect/>
+          </a:stretch>
+        </p:blipFill>
+        <p:spPr>
+          <a:xfrm>
+            <a:off x="6334811" y="3924121"/>
+            <a:ext cx="5336753" cy="2083451"/>
+          </a:xfrm>
+          <a:prstGeom prst="rect">
+            <a:avLst/>
+          </a:prstGeom>
+        </p:spPr>
+      </p:pic>
+    </p:spTree>
+    <p:extLst>
+      <p:ext uri="{BB962C8B-B14F-4D97-AF65-F5344CB8AC3E}">
+        <p14:creationId xmlns:p14="http://schemas.microsoft.com/office/powerpoint/2010/main" val="734207749"/>
+      </p:ext>
+    </p:extLst>
+  </p:cSld>
+  <p:clrMapOvr>
+    <a:masterClrMapping/>
+  </p:clrMapOvr>
+</p:sld>
+</file>
+
+<file path=ppt/slides/slide9.xml><?xml version="1.0" encoding="utf-8"?>
+<p:sld xmlns:a="http://schemas.openxmlformats.org/drawingml/2006/main" xmlns:r="http://schemas.openxmlformats.org/officeDocument/2006/relationships" xmlns:p="http://schemas.openxmlformats.org/presentationml/2006/main">
+  <p:cSld>
+    <p:spTree>
+      <p:nvGrpSpPr>
+        <p:cNvPr id="1" name=""/>
+        <p:cNvGrpSpPr/>
+        <p:nvPr/>
+      </p:nvGrpSpPr>
+      <p:grpSpPr>
+        <a:xfrm>
+          <a:off x="0" y="0"/>
+          <a:ext cx="0" cy="0"/>
+          <a:chOff x="0" y="0"/>
+          <a:chExt cx="0" cy="0"/>
+        </a:xfrm>
+      </p:grpSpPr>
+      <p:sp>
+        <p:nvSpPr>
+          <p:cNvPr id="4" name="Rectangle 3">
+            <a:extLst>
+              <a:ext uri="{FF2B5EF4-FFF2-40B4-BE49-F238E27FC236}">
+                <a16:creationId xmlns:a16="http://schemas.microsoft.com/office/drawing/2014/main" id="{B95D1BC1-55D5-4970-97A8-5FA3E7ABB530}"/>
+              </a:ext>
+            </a:extLst>
+          </p:cNvPr>
+          <p:cNvSpPr/>
+          <p:nvPr/>
+        </p:nvSpPr>
+        <p:spPr>
+          <a:xfrm>
+            <a:off x="3546096" y="541375"/>
+            <a:ext cx="5155835" cy="923330"/>
           </a:xfrm>
           <a:prstGeom prst="rect">
             <a:avLst/>
@@ -4665,7 +6028,7 @@
                   </a:outerShdw>
                 </a:effectLst>
               </a:rPr>
-              <a:t>Список литературы</a:t>
+              <a:t>Текущие выводы</a:t>
             </a:r>
             <a:endParaRPr lang="en-US" sz="5400" b="0" cap="none" spc="0" dirty="0">
               <a:ln w="0"/>
@@ -4685,10 +6048,10 @@
       </p:sp>
       <p:sp>
         <p:nvSpPr>
-          <p:cNvPr id="2" name="Rectangle 1">
-            <a:extLst>
-              <a:ext uri="{FF2B5EF4-FFF2-40B4-BE49-F238E27FC236}">
-                <a16:creationId xmlns:a16="http://schemas.microsoft.com/office/drawing/2014/main" id="{4A3066C0-128A-4B1F-9016-5BCE586DAA19}"/>
+          <p:cNvPr id="3" name="Rectangle 2">
+            <a:extLst>
+              <a:ext uri="{FF2B5EF4-FFF2-40B4-BE49-F238E27FC236}">
+                <a16:creationId xmlns:a16="http://schemas.microsoft.com/office/drawing/2014/main" id="{83CF3ABD-E0CB-4311-B3FC-E50D25EBD6F2}"/>
               </a:ext>
             </a:extLst>
           </p:cNvPr>
@@ -4697,8 +6060,8 @@
         </p:nvSpPr>
         <p:spPr>
           <a:xfrm>
-            <a:off x="3338791" y="1805206"/>
-            <a:ext cx="5514417" cy="954107"/>
+            <a:off x="2646805" y="2058885"/>
+            <a:ext cx="6954416" cy="4154984"/>
           </a:xfrm>
           <a:prstGeom prst="rect">
             <a:avLst/>
@@ -4710,351 +6073,73 @@
           </a:bodyPr>
           <a:lstStyle/>
           <a:p>
-            <a:r>
-              <a:rPr lang="en-US" sz="1400" dirty="0" err="1"/>
-              <a:t>Chieu</a:t>
-            </a:r>
-            <a:r>
-              <a:rPr lang="en-US" sz="1400" dirty="0"/>
-              <a:t>, H. L., and Ng, H. T. Named entity recognition</a:t>
-            </a:r>
-            <a:r>
-              <a:rPr lang="ru-RU" sz="1400" dirty="0"/>
-              <a:t> </a:t>
-            </a:r>
-            <a:r>
-              <a:rPr lang="en-US" sz="1400" dirty="0"/>
-              <a:t>with a maximum entropy approach. In Proceedings of</a:t>
-            </a:r>
-            <a:r>
-              <a:rPr lang="ru-RU" sz="1400" dirty="0"/>
-              <a:t> </a:t>
-            </a:r>
-            <a:r>
-              <a:rPr lang="en-US" sz="1400" dirty="0"/>
-              <a:t>the Seventh Conference on Natural Language Learning</a:t>
-            </a:r>
-            <a:r>
-              <a:rPr lang="ru-RU" sz="1400" dirty="0"/>
-              <a:t> </a:t>
-            </a:r>
-            <a:r>
-              <a:rPr lang="en-US" sz="1400" dirty="0"/>
-              <a:t>at HLT-NAACL 2003 - Volume 4 (Stroudsburg, PA,</a:t>
-            </a:r>
-            <a:r>
-              <a:rPr lang="ru-RU" sz="1400" dirty="0"/>
-              <a:t> </a:t>
-            </a:r>
-            <a:r>
-              <a:rPr lang="en-US" sz="1400" dirty="0"/>
-              <a:t>USA, 2003), CONLL ’03, Association for Computational</a:t>
-            </a:r>
-            <a:r>
-              <a:rPr lang="ru-RU" sz="1400" dirty="0"/>
-              <a:t> </a:t>
-            </a:r>
-            <a:r>
-              <a:rPr lang="en-US" sz="1400" dirty="0"/>
-              <a:t>Linguistics, pp. 160–163.</a:t>
-            </a:r>
-          </a:p>
-        </p:txBody>
-      </p:sp>
-      <p:sp>
-        <p:nvSpPr>
-          <p:cNvPr id="3" name="Rectangle 2">
-            <a:extLst>
-              <a:ext uri="{FF2B5EF4-FFF2-40B4-BE49-F238E27FC236}">
-                <a16:creationId xmlns:a16="http://schemas.microsoft.com/office/drawing/2014/main" id="{97500E18-11E6-4474-A43F-C588B1E6F529}"/>
-              </a:ext>
-            </a:extLst>
-          </p:cNvPr>
-          <p:cNvSpPr/>
-          <p:nvPr/>
-        </p:nvSpPr>
-        <p:spPr>
-          <a:xfrm>
-            <a:off x="3338791" y="3897922"/>
-            <a:ext cx="6096000" cy="523220"/>
-          </a:xfrm>
-          <a:prstGeom prst="rect">
-            <a:avLst/>
-          </a:prstGeom>
-        </p:spPr>
-        <p:txBody>
-          <a:bodyPr>
-            <a:spAutoFit/>
-          </a:bodyPr>
-          <a:lstStyle/>
-          <a:p>
-            <a:r>
-              <a:rPr lang="en-US" sz="1400" dirty="0"/>
-              <a:t>Chiu, J. P. C., and Nichols, E. Named entity recognition</a:t>
-            </a:r>
-            <a:r>
-              <a:rPr lang="ru-RU" sz="1400" dirty="0"/>
-              <a:t> </a:t>
-            </a:r>
-            <a:r>
-              <a:rPr lang="en-US" sz="1400" dirty="0"/>
-              <a:t>with bidirectional </a:t>
-            </a:r>
-            <a:r>
-              <a:rPr lang="en-US" sz="1400" dirty="0" err="1"/>
-              <a:t>lstm-cnns</a:t>
-            </a:r>
-            <a:r>
-              <a:rPr lang="en-US" sz="1400" dirty="0"/>
-              <a:t>. </a:t>
-            </a:r>
-            <a:r>
-              <a:rPr lang="en-US" sz="1400" dirty="0" err="1"/>
-              <a:t>CoRR</a:t>
-            </a:r>
-            <a:r>
-              <a:rPr lang="en-US" sz="1400" dirty="0"/>
-              <a:t> abs/1511.08308</a:t>
-            </a:r>
-            <a:r>
-              <a:rPr lang="ru-RU" sz="1400" dirty="0"/>
-              <a:t> </a:t>
-            </a:r>
-            <a:r>
-              <a:rPr lang="en-US" sz="1400" dirty="0"/>
-              <a:t>(2015).</a:t>
-            </a:r>
-          </a:p>
-        </p:txBody>
-      </p:sp>
-      <p:sp>
-        <p:nvSpPr>
-          <p:cNvPr id="5" name="Rectangle 4">
-            <a:extLst>
-              <a:ext uri="{FF2B5EF4-FFF2-40B4-BE49-F238E27FC236}">
-                <a16:creationId xmlns:a16="http://schemas.microsoft.com/office/drawing/2014/main" id="{A5312259-6FDB-4C73-B025-F230DFB06DBD}"/>
-              </a:ext>
-            </a:extLst>
-          </p:cNvPr>
-          <p:cNvSpPr/>
-          <p:nvPr/>
-        </p:nvSpPr>
-        <p:spPr>
-          <a:xfrm>
-            <a:off x="3338791" y="4513393"/>
-            <a:ext cx="6096000" cy="523220"/>
-          </a:xfrm>
-          <a:prstGeom prst="rect">
-            <a:avLst/>
-          </a:prstGeom>
-        </p:spPr>
-        <p:txBody>
-          <a:bodyPr>
-            <a:spAutoFit/>
-          </a:bodyPr>
-          <a:lstStyle/>
-          <a:p>
-            <a:r>
-              <a:rPr lang="en-US" sz="1400" dirty="0"/>
-              <a:t>Ma, X., and </a:t>
-            </a:r>
-            <a:r>
-              <a:rPr lang="en-US" sz="1400" dirty="0" err="1"/>
-              <a:t>Hovy</a:t>
-            </a:r>
-            <a:r>
-              <a:rPr lang="en-US" sz="1400" dirty="0"/>
-              <a:t>, E. H. End-to-end sequence labeling</a:t>
-            </a:r>
-            <a:r>
-              <a:rPr lang="ru-RU" sz="1400" dirty="0"/>
-              <a:t> </a:t>
-            </a:r>
-            <a:r>
-              <a:rPr lang="en-US" sz="1400" dirty="0"/>
-              <a:t>via bi-directional </a:t>
-            </a:r>
-            <a:r>
-              <a:rPr lang="en-US" sz="1400" dirty="0" err="1"/>
-              <a:t>lstm-cnns-crf</a:t>
-            </a:r>
-            <a:r>
-              <a:rPr lang="en-US" sz="1400" dirty="0"/>
-              <a:t>. </a:t>
-            </a:r>
-            <a:r>
-              <a:rPr lang="en-US" sz="1400" dirty="0" err="1"/>
-              <a:t>CoRR</a:t>
-            </a:r>
-            <a:r>
-              <a:rPr lang="en-US" sz="1400" dirty="0"/>
-              <a:t> abs/1603.01354</a:t>
-            </a:r>
-            <a:r>
-              <a:rPr lang="ru-RU" sz="1400" dirty="0"/>
-              <a:t> </a:t>
-            </a:r>
-            <a:r>
-              <a:rPr lang="en-US" sz="1400" dirty="0"/>
-              <a:t>(2016).</a:t>
-            </a:r>
-          </a:p>
-        </p:txBody>
-      </p:sp>
-      <p:sp>
-        <p:nvSpPr>
-          <p:cNvPr id="6" name="Rectangle 5">
-            <a:extLst>
-              <a:ext uri="{FF2B5EF4-FFF2-40B4-BE49-F238E27FC236}">
-                <a16:creationId xmlns:a16="http://schemas.microsoft.com/office/drawing/2014/main" id="{C7C8DF42-E1CF-4764-9C45-C9EE663D27CC}"/>
-              </a:ext>
-            </a:extLst>
-          </p:cNvPr>
-          <p:cNvSpPr/>
-          <p:nvPr/>
-        </p:nvSpPr>
-        <p:spPr>
-          <a:xfrm>
-            <a:off x="3338791" y="5128864"/>
-            <a:ext cx="6096000" cy="954107"/>
-          </a:xfrm>
-          <a:prstGeom prst="rect">
-            <a:avLst/>
-          </a:prstGeom>
-        </p:spPr>
-        <p:txBody>
-          <a:bodyPr>
-            <a:spAutoFit/>
-          </a:bodyPr>
-          <a:lstStyle/>
-          <a:p>
-            <a:r>
-              <a:rPr lang="en-US" sz="1400" dirty="0" err="1"/>
-              <a:t>Nothman</a:t>
-            </a:r>
-            <a:r>
-              <a:rPr lang="en-US" sz="1400" dirty="0"/>
-              <a:t>, J., Ringland, N., Radford, W., Murphy, T.,</a:t>
-            </a:r>
-            <a:r>
-              <a:rPr lang="ru-RU" sz="1400" dirty="0"/>
-              <a:t> </a:t>
-            </a:r>
-            <a:r>
-              <a:rPr lang="en-US" sz="1400" dirty="0"/>
-              <a:t>and Curran, J. R. Learning multilingual named entity</a:t>
-            </a:r>
-            <a:r>
-              <a:rPr lang="ru-RU" sz="1400" dirty="0"/>
-              <a:t> </a:t>
-            </a:r>
-            <a:r>
-              <a:rPr lang="en-US" sz="1400" dirty="0"/>
-              <a:t>recognition from </a:t>
-            </a:r>
-            <a:r>
-              <a:rPr lang="en-US" sz="1400" dirty="0" err="1"/>
-              <a:t>wikipedia</a:t>
-            </a:r>
-            <a:r>
-              <a:rPr lang="en-US" sz="1400" dirty="0"/>
-              <a:t>. Artiﬁcial Intelligence 194,</a:t>
-            </a:r>
-          </a:p>
-          <a:p>
-            <a:r>
-              <a:rPr lang="en-US" sz="1400" dirty="0"/>
-              <a:t>Supplement C (2013), 151 – 175. Artiﬁcial Intelligence,</a:t>
-            </a:r>
-            <a:r>
-              <a:rPr lang="ru-RU" sz="1400" dirty="0"/>
-              <a:t> </a:t>
-            </a:r>
-            <a:r>
-              <a:rPr lang="en-US" sz="1400" dirty="0"/>
-              <a:t>Wikipedia and Semi-Structured Resources.</a:t>
-            </a:r>
-          </a:p>
-        </p:txBody>
-      </p:sp>
-      <p:sp>
-        <p:nvSpPr>
-          <p:cNvPr id="7" name="Rectangle 6">
-            <a:extLst>
-              <a:ext uri="{FF2B5EF4-FFF2-40B4-BE49-F238E27FC236}">
-                <a16:creationId xmlns:a16="http://schemas.microsoft.com/office/drawing/2014/main" id="{1EBE7E78-6839-4686-8D27-97DD5526DF7D}"/>
-              </a:ext>
-            </a:extLst>
-          </p:cNvPr>
-          <p:cNvSpPr/>
-          <p:nvPr/>
-        </p:nvSpPr>
-        <p:spPr>
-          <a:xfrm>
-            <a:off x="3338791" y="2851564"/>
-            <a:ext cx="6096000" cy="954107"/>
-          </a:xfrm>
-          <a:prstGeom prst="rect">
-            <a:avLst/>
-          </a:prstGeom>
-        </p:spPr>
-        <p:txBody>
-          <a:bodyPr>
-            <a:spAutoFit/>
-          </a:bodyPr>
-          <a:lstStyle/>
-          <a:p>
-            <a:r>
-              <a:rPr lang="en-US" sz="1400" dirty="0"/>
-              <a:t>Florian, R., </a:t>
-            </a:r>
-            <a:r>
-              <a:rPr lang="en-US" sz="1400" dirty="0" err="1"/>
-              <a:t>Ittycheriah</a:t>
-            </a:r>
-            <a:r>
-              <a:rPr lang="en-US" sz="1400" dirty="0"/>
-              <a:t>, A., Jing, H., and Zhang, T.</a:t>
-            </a:r>
-            <a:r>
-              <a:rPr lang="ru-RU" sz="1400" dirty="0"/>
-              <a:t> </a:t>
-            </a:r>
-            <a:r>
-              <a:rPr lang="en-US" sz="1400" dirty="0"/>
-              <a:t>Named entity recognition through classiﬁer combination.</a:t>
-            </a:r>
-            <a:r>
-              <a:rPr lang="ru-RU" sz="1400" dirty="0"/>
-              <a:t> </a:t>
-            </a:r>
-            <a:r>
-              <a:rPr lang="en-US" sz="1400" dirty="0"/>
-              <a:t>In Proceedings of the Seventh Conference on Natural</a:t>
-            </a:r>
-            <a:r>
-              <a:rPr lang="ru-RU" sz="1400" dirty="0"/>
-              <a:t> </a:t>
-            </a:r>
-            <a:r>
-              <a:rPr lang="en-US" sz="1400" dirty="0"/>
-              <a:t>Language Learning at HLT-NAACL 2003 - Volume 4</a:t>
-            </a:r>
-            <a:r>
-              <a:rPr lang="ru-RU" sz="1400" dirty="0"/>
-              <a:t> </a:t>
-            </a:r>
-            <a:r>
-              <a:rPr lang="en-US" sz="1400" dirty="0"/>
-              <a:t>(Stroudsburg, PA, USA, 2003), CONLL ’03, Association</a:t>
-            </a:r>
-            <a:r>
-              <a:rPr lang="ru-RU" sz="1400" dirty="0"/>
-              <a:t> </a:t>
-            </a:r>
-            <a:r>
-              <a:rPr lang="en-US" sz="1400" dirty="0"/>
-              <a:t>for Computational Linguistics, pp. 168–171.</a:t>
+            <a:pPr marL="342900" indent="-342900">
+              <a:buFont typeface="Arial" panose="020B0604020202020204" pitchFamily="34" charset="0"/>
+              <a:buChar char="•"/>
+            </a:pPr>
+            <a:r>
+              <a:rPr lang="ru-RU" sz="2400" dirty="0"/>
+              <a:t>Самыми распространенными алгоритмами для решения задача </a:t>
+            </a:r>
+            <a:r>
+              <a:rPr lang="en-US" sz="2400" dirty="0"/>
+              <a:t>NER </a:t>
+            </a:r>
+            <a:r>
+              <a:rPr lang="ru-RU" sz="2400" dirty="0"/>
+              <a:t>являются </a:t>
+            </a:r>
+            <a:r>
+              <a:rPr lang="en-US" sz="2400" dirty="0"/>
+              <a:t>HMM, CRF, CNN+BLSTN</a:t>
+            </a:r>
+          </a:p>
+          <a:p>
+            <a:pPr marL="342900" indent="-342900">
+              <a:buFont typeface="Arial" panose="020B0604020202020204" pitchFamily="34" charset="0"/>
+              <a:buChar char="•"/>
+            </a:pPr>
+            <a:r>
+              <a:rPr lang="ru-RU" sz="2400" dirty="0"/>
+              <a:t>Ранее уже разрабатывались алгоритмы, использовавшие глобальный контекст, дальнейшие исследования можно основывать на соответствующих статьях</a:t>
+            </a:r>
+          </a:p>
+          <a:p>
+            <a:pPr marL="342900" indent="-342900">
+              <a:buFont typeface="Arial" panose="020B0604020202020204" pitchFamily="34" charset="0"/>
+              <a:buChar char="•"/>
+            </a:pPr>
+            <a:r>
+              <a:rPr lang="ru-RU" sz="2400" dirty="0"/>
+              <a:t>Из </a:t>
+            </a:r>
+            <a:r>
+              <a:rPr lang="en-US" sz="2400" dirty="0"/>
+              <a:t>“</a:t>
+            </a:r>
+            <a:r>
+              <a:rPr lang="ru-RU" sz="2400" dirty="0"/>
+              <a:t>обычных</a:t>
+            </a:r>
+            <a:r>
+              <a:rPr lang="en-US" sz="2400" dirty="0"/>
+              <a:t>”</a:t>
+            </a:r>
+            <a:r>
+              <a:rPr lang="ru-RU" sz="2400" dirty="0"/>
+              <a:t> классификаторов лучше справляются </a:t>
+            </a:r>
+            <a:r>
+              <a:rPr lang="en-US" sz="2400" dirty="0" err="1"/>
+              <a:t>LogisticRegression</a:t>
+            </a:r>
+            <a:r>
+              <a:rPr lang="en-US" sz="2400" dirty="0"/>
+              <a:t>, SVM, </a:t>
+            </a:r>
+            <a:r>
+              <a:rPr lang="ru-RU" sz="2400" dirty="0"/>
+              <a:t>алгоритмы на деревьях от них отстают (без подбора параметров)</a:t>
             </a:r>
           </a:p>
         </p:txBody>
@@ -5062,7 +6147,7 @@
     </p:spTree>
     <p:extLst>
       <p:ext uri="{BB962C8B-B14F-4D97-AF65-F5344CB8AC3E}">
-        <p14:creationId xmlns:p14="http://schemas.microsoft.com/office/powerpoint/2010/main" val="3581645244"/>
+        <p14:creationId xmlns:p14="http://schemas.microsoft.com/office/powerpoint/2010/main" val="51516451"/>
       </p:ext>
     </p:extLst>
   </p:cSld>
@@ -5365,4 +6450,299 @@
     </a:ext>
   </a:extLst>
 </a:theme>
+</file>
+
+<file path=ppt/theme/theme2.xml><?xml version="1.0" encoding="utf-8"?>
+<a:theme xmlns:a="http://schemas.openxmlformats.org/drawingml/2006/main" name="Office Theme">
+  <a:themeElements>
+    <a:clrScheme name="Office">
+      <a:dk1>
+        <a:sysClr val="windowText" lastClr="000000"/>
+      </a:dk1>
+      <a:lt1>
+        <a:sysClr val="window" lastClr="FFFFFF"/>
+      </a:lt1>
+      <a:dk2>
+        <a:srgbClr val="44546A"/>
+      </a:dk2>
+      <a:lt2>
+        <a:srgbClr val="E7E6E6"/>
+      </a:lt2>
+      <a:accent1>
+        <a:srgbClr val="4472C4"/>
+      </a:accent1>
+      <a:accent2>
+        <a:srgbClr val="ED7D31"/>
+      </a:accent2>
+      <a:accent3>
+        <a:srgbClr val="A5A5A5"/>
+      </a:accent3>
+      <a:accent4>
+        <a:srgbClr val="FFC000"/>
+      </a:accent4>
+      <a:accent5>
+        <a:srgbClr val="5B9BD5"/>
+      </a:accent5>
+      <a:accent6>
+        <a:srgbClr val="70AD47"/>
+      </a:accent6>
+      <a:hlink>
+        <a:srgbClr val="0563C1"/>
+      </a:hlink>
+      <a:folHlink>
+        <a:srgbClr val="954F72"/>
+      </a:folHlink>
+    </a:clrScheme>
+    <a:fontScheme name="Office">
+      <a:majorFont>
+        <a:latin typeface="Calibri Light" panose="020F0302020204030204"/>
+        <a:ea typeface=""/>
+        <a:cs typeface=""/>
+        <a:font script="Jpan" typeface="游ゴシック Light"/>
+        <a:font script="Hang" typeface="맑은 고딕"/>
+        <a:font script="Hans" typeface="等线 Light"/>
+        <a:font script="Hant" typeface="新細明體"/>
+        <a:font script="Arab" typeface="Times New Roman"/>
+        <a:font script="Hebr" typeface="Times New Roman"/>
+        <a:font script="Thai" typeface="Angsana New"/>
+        <a:font script="Ethi" typeface="Nyala"/>
+        <a:font script="Beng" typeface="Vrinda"/>
+        <a:font script="Gujr" typeface="Shruti"/>
+        <a:font script="Khmr" typeface="MoolBoran"/>
+        <a:font script="Knda" typeface="Tunga"/>
+        <a:font script="Guru" typeface="Raavi"/>
+        <a:font script="Cans" typeface="Euphemia"/>
+        <a:font script="Cher" typeface="Plantagenet Cherokee"/>
+        <a:font script="Yiii" typeface="Microsoft Yi Baiti"/>
+        <a:font script="Tibt" typeface="Microsoft Himalaya"/>
+        <a:font script="Thaa" typeface="MV Boli"/>
+        <a:font script="Deva" typeface="Mangal"/>
+        <a:font script="Telu" typeface="Gautami"/>
+        <a:font script="Taml" typeface="Latha"/>
+        <a:font script="Syrc" typeface="Estrangelo Edessa"/>
+        <a:font script="Orya" typeface="Kalinga"/>
+        <a:font script="Mlym" typeface="Kartika"/>
+        <a:font script="Laoo" typeface="DokChampa"/>
+        <a:font script="Sinh" typeface="Iskoola Pota"/>
+        <a:font script="Mong" typeface="Mongolian Baiti"/>
+        <a:font script="Viet" typeface="Times New Roman"/>
+        <a:font script="Uigh" typeface="Microsoft Uighur"/>
+        <a:font script="Geor" typeface="Sylfaen"/>
+        <a:font script="Armn" typeface="Arial"/>
+        <a:font script="Bugi" typeface="Leelawadee UI"/>
+        <a:font script="Bopo" typeface="Microsoft JhengHei"/>
+        <a:font script="Java" typeface="Javanese Text"/>
+        <a:font script="Lisu" typeface="Segoe UI"/>
+        <a:font script="Mymr" typeface="Myanmar Text"/>
+        <a:font script="Nkoo" typeface="Ebrima"/>
+        <a:font script="Olck" typeface="Nirmala UI"/>
+        <a:font script="Osma" typeface="Ebrima"/>
+        <a:font script="Phag" typeface="Phagspa"/>
+        <a:font script="Syrn" typeface="Estrangelo Edessa"/>
+        <a:font script="Syrj" typeface="Estrangelo Edessa"/>
+        <a:font script="Syre" typeface="Estrangelo Edessa"/>
+        <a:font script="Sora" typeface="Nirmala UI"/>
+        <a:font script="Tale" typeface="Microsoft Tai Le"/>
+        <a:font script="Talu" typeface="Microsoft New Tai Lue"/>
+        <a:font script="Tfng" typeface="Ebrima"/>
+      </a:majorFont>
+      <a:minorFont>
+        <a:latin typeface="Calibri" panose="020F0502020204030204"/>
+        <a:ea typeface=""/>
+        <a:cs typeface=""/>
+        <a:font script="Jpan" typeface="游ゴシック"/>
+        <a:font script="Hang" typeface="맑은 고딕"/>
+        <a:font script="Hans" typeface="等线"/>
+        <a:font script="Hant" typeface="新細明體"/>
+        <a:font script="Arab" typeface="Arial"/>
+        <a:font script="Hebr" typeface="Arial"/>
+        <a:font script="Thai" typeface="Cordia New"/>
+        <a:font script="Ethi" typeface="Nyala"/>
+        <a:font script="Beng" typeface="Vrinda"/>
+        <a:font script="Gujr" typeface="Shruti"/>
+        <a:font script="Khmr" typeface="DaunPenh"/>
+        <a:font script="Knda" typeface="Tunga"/>
+        <a:font script="Guru" typeface="Raavi"/>
+        <a:font script="Cans" typeface="Euphemia"/>
+        <a:font script="Cher" typeface="Plantagenet Cherokee"/>
+        <a:font script="Yiii" typeface="Microsoft Yi Baiti"/>
+        <a:font script="Tibt" typeface="Microsoft Himalaya"/>
+        <a:font script="Thaa" typeface="MV Boli"/>
+        <a:font script="Deva" typeface="Mangal"/>
+        <a:font script="Telu" typeface="Gautami"/>
+        <a:font script="Taml" typeface="Latha"/>
+        <a:font script="Syrc" typeface="Estrangelo Edessa"/>
+        <a:font script="Orya" typeface="Kalinga"/>
+        <a:font script="Mlym" typeface="Kartika"/>
+        <a:font script="Laoo" typeface="DokChampa"/>
+        <a:font script="Sinh" typeface="Iskoola Pota"/>
+        <a:font script="Mong" typeface="Mongolian Baiti"/>
+        <a:font script="Viet" typeface="Arial"/>
+        <a:font script="Uigh" typeface="Microsoft Uighur"/>
+        <a:font script="Geor" typeface="Sylfaen"/>
+        <a:font script="Armn" typeface="Arial"/>
+        <a:font script="Bugi" typeface="Leelawadee UI"/>
+        <a:font script="Bopo" typeface="Microsoft JhengHei"/>
+        <a:font script="Java" typeface="Javanese Text"/>
+        <a:font script="Lisu" typeface="Segoe UI"/>
+        <a:font script="Mymr" typeface="Myanmar Text"/>
+        <a:font script="Nkoo" typeface="Ebrima"/>
+        <a:font script="Olck" typeface="Nirmala UI"/>
+        <a:font script="Osma" typeface="Ebrima"/>
+        <a:font script="Phag" typeface="Phagspa"/>
+        <a:font script="Syrn" typeface="Estrangelo Edessa"/>
+        <a:font script="Syrj" typeface="Estrangelo Edessa"/>
+        <a:font script="Syre" typeface="Estrangelo Edessa"/>
+        <a:font script="Sora" typeface="Nirmala UI"/>
+        <a:font script="Tale" typeface="Microsoft Tai Le"/>
+        <a:font script="Talu" typeface="Microsoft New Tai Lue"/>
+        <a:font script="Tfng" typeface="Ebrima"/>
+      </a:minorFont>
+    </a:fontScheme>
+    <a:fmtScheme name="Office">
+      <a:fillStyleLst>
+        <a:solidFill>
+          <a:schemeClr val="phClr"/>
+        </a:solidFill>
+        <a:gradFill rotWithShape="1">
+          <a:gsLst>
+            <a:gs pos="0">
+              <a:schemeClr val="phClr">
+                <a:lumMod val="110000"/>
+                <a:satMod val="105000"/>
+                <a:tint val="67000"/>
+              </a:schemeClr>
+            </a:gs>
+            <a:gs pos="50000">
+              <a:schemeClr val="phClr">
+                <a:lumMod val="105000"/>
+                <a:satMod val="103000"/>
+                <a:tint val="73000"/>
+              </a:schemeClr>
+            </a:gs>
+            <a:gs pos="100000">
+              <a:schemeClr val="phClr">
+                <a:lumMod val="105000"/>
+                <a:satMod val="109000"/>
+                <a:tint val="81000"/>
+              </a:schemeClr>
+            </a:gs>
+          </a:gsLst>
+          <a:lin ang="5400000" scaled="0"/>
+        </a:gradFill>
+        <a:gradFill rotWithShape="1">
+          <a:gsLst>
+            <a:gs pos="0">
+              <a:schemeClr val="phClr">
+                <a:satMod val="103000"/>
+                <a:lumMod val="102000"/>
+                <a:tint val="94000"/>
+              </a:schemeClr>
+            </a:gs>
+            <a:gs pos="50000">
+              <a:schemeClr val="phClr">
+                <a:satMod val="110000"/>
+                <a:lumMod val="100000"/>
+                <a:shade val="100000"/>
+              </a:schemeClr>
+            </a:gs>
+            <a:gs pos="100000">
+              <a:schemeClr val="phClr">
+                <a:lumMod val="99000"/>
+                <a:satMod val="120000"/>
+                <a:shade val="78000"/>
+              </a:schemeClr>
+            </a:gs>
+          </a:gsLst>
+          <a:lin ang="5400000" scaled="0"/>
+        </a:gradFill>
+      </a:fillStyleLst>
+      <a:lnStyleLst>
+        <a:ln w="6350" cap="flat" cmpd="sng" algn="ctr">
+          <a:solidFill>
+            <a:schemeClr val="phClr"/>
+          </a:solidFill>
+          <a:prstDash val="solid"/>
+          <a:miter lim="800000"/>
+        </a:ln>
+        <a:ln w="12700" cap="flat" cmpd="sng" algn="ctr">
+          <a:solidFill>
+            <a:schemeClr val="phClr"/>
+          </a:solidFill>
+          <a:prstDash val="solid"/>
+          <a:miter lim="800000"/>
+        </a:ln>
+        <a:ln w="19050" cap="flat" cmpd="sng" algn="ctr">
+          <a:solidFill>
+            <a:schemeClr val="phClr"/>
+          </a:solidFill>
+          <a:prstDash val="solid"/>
+          <a:miter lim="800000"/>
+        </a:ln>
+      </a:lnStyleLst>
+      <a:effectStyleLst>
+        <a:effectStyle>
+          <a:effectLst/>
+        </a:effectStyle>
+        <a:effectStyle>
+          <a:effectLst/>
+        </a:effectStyle>
+        <a:effectStyle>
+          <a:effectLst>
+            <a:outerShdw blurRad="57150" dist="19050" dir="5400000" algn="ctr" rotWithShape="0">
+              <a:srgbClr val="000000">
+                <a:alpha val="63000"/>
+              </a:srgbClr>
+            </a:outerShdw>
+          </a:effectLst>
+        </a:effectStyle>
+      </a:effectStyleLst>
+      <a:bgFillStyleLst>
+        <a:solidFill>
+          <a:schemeClr val="phClr"/>
+        </a:solidFill>
+        <a:solidFill>
+          <a:schemeClr val="phClr">
+            <a:tint val="95000"/>
+            <a:satMod val="170000"/>
+          </a:schemeClr>
+        </a:solidFill>
+        <a:gradFill rotWithShape="1">
+          <a:gsLst>
+            <a:gs pos="0">
+              <a:schemeClr val="phClr">
+                <a:tint val="93000"/>
+                <a:satMod val="150000"/>
+                <a:shade val="98000"/>
+                <a:lumMod val="102000"/>
+              </a:schemeClr>
+            </a:gs>
+            <a:gs pos="50000">
+              <a:schemeClr val="phClr">
+                <a:tint val="98000"/>
+                <a:satMod val="130000"/>
+                <a:shade val="90000"/>
+                <a:lumMod val="103000"/>
+              </a:schemeClr>
+            </a:gs>
+            <a:gs pos="100000">
+              <a:schemeClr val="phClr">
+                <a:shade val="63000"/>
+                <a:satMod val="120000"/>
+              </a:schemeClr>
+            </a:gs>
+          </a:gsLst>
+          <a:lin ang="5400000" scaled="0"/>
+        </a:gradFill>
+      </a:bgFillStyleLst>
+    </a:fmtScheme>
+  </a:themeElements>
+  <a:objectDefaults/>
+  <a:extraClrSchemeLst/>
+  <a:extLst>
+    <a:ext uri="{05A4C25C-085E-4340-85A3-A5531E510DB2}">
+      <thm15:themeFamily xmlns:thm15="http://schemas.microsoft.com/office/thememl/2012/main" name="Office Theme" id="{62F939B6-93AF-4DB8-9C6B-D6C7DFDC589F}" vid="{4A3C46E8-61CC-4603-A589-7422A47A8E4A}"/>
+    </a:ext>
+  </a:extLst>
+</a:theme>
 </file>
</xml_diff>

<commit_message>
Added Estimator and Base Tuning
</commit_message>
<xml_diff>
--- a/control/First Control.pptx
+++ b/control/First Control.pptx
@@ -15,7 +15,7 @@
     <p:sldId id="260" r:id="rId6"/>
     <p:sldId id="263" r:id="rId7"/>
     <p:sldId id="267" r:id="rId8"/>
-    <p:sldId id="266" r:id="rId9"/>
+    <p:sldId id="268" r:id="rId9"/>
     <p:sldId id="261" r:id="rId10"/>
     <p:sldId id="262" r:id="rId11"/>
   </p:sldIdLst>
@@ -210,7 +210,7 @@
           <a:p>
             <a:fld id="{652E631F-D9ED-4C42-BDDB-CA9A8D11E41C}" type="datetimeFigureOut">
               <a:rPr lang="en-US" smtClean="0"/>
-              <a:t>26-Nov-17</a:t>
+              <a:t>27-Nov-17</a:t>
             </a:fld>
             <a:endParaRPr lang="en-US"/>
           </a:p>
@@ -708,7 +708,7 @@
           <a:p>
             <a:fld id="{B11D0E9A-F31F-4A59-82D2-0D43B3059045}" type="datetimeFigureOut">
               <a:rPr lang="en-US" smtClean="0"/>
-              <a:t>26-Nov-17</a:t>
+              <a:t>27-Nov-17</a:t>
             </a:fld>
             <a:endParaRPr lang="en-US"/>
           </a:p>
@@ -906,7 +906,7 @@
           <a:p>
             <a:fld id="{B11D0E9A-F31F-4A59-82D2-0D43B3059045}" type="datetimeFigureOut">
               <a:rPr lang="en-US" smtClean="0"/>
-              <a:t>26-Nov-17</a:t>
+              <a:t>27-Nov-17</a:t>
             </a:fld>
             <a:endParaRPr lang="en-US"/>
           </a:p>
@@ -1114,7 +1114,7 @@
           <a:p>
             <a:fld id="{B11D0E9A-F31F-4A59-82D2-0D43B3059045}" type="datetimeFigureOut">
               <a:rPr lang="en-US" smtClean="0"/>
-              <a:t>26-Nov-17</a:t>
+              <a:t>27-Nov-17</a:t>
             </a:fld>
             <a:endParaRPr lang="en-US"/>
           </a:p>
@@ -1312,7 +1312,7 @@
           <a:p>
             <a:fld id="{B11D0E9A-F31F-4A59-82D2-0D43B3059045}" type="datetimeFigureOut">
               <a:rPr lang="en-US" smtClean="0"/>
-              <a:t>26-Nov-17</a:t>
+              <a:t>27-Nov-17</a:t>
             </a:fld>
             <a:endParaRPr lang="en-US"/>
           </a:p>
@@ -1587,7 +1587,7 @@
           <a:p>
             <a:fld id="{B11D0E9A-F31F-4A59-82D2-0D43B3059045}" type="datetimeFigureOut">
               <a:rPr lang="en-US" smtClean="0"/>
-              <a:t>26-Nov-17</a:t>
+              <a:t>27-Nov-17</a:t>
             </a:fld>
             <a:endParaRPr lang="en-US"/>
           </a:p>
@@ -1852,7 +1852,7 @@
           <a:p>
             <a:fld id="{B11D0E9A-F31F-4A59-82D2-0D43B3059045}" type="datetimeFigureOut">
               <a:rPr lang="en-US" smtClean="0"/>
-              <a:t>26-Nov-17</a:t>
+              <a:t>27-Nov-17</a:t>
             </a:fld>
             <a:endParaRPr lang="en-US"/>
           </a:p>
@@ -2264,7 +2264,7 @@
           <a:p>
             <a:fld id="{B11D0E9A-F31F-4A59-82D2-0D43B3059045}" type="datetimeFigureOut">
               <a:rPr lang="en-US" smtClean="0"/>
-              <a:t>26-Nov-17</a:t>
+              <a:t>27-Nov-17</a:t>
             </a:fld>
             <a:endParaRPr lang="en-US"/>
           </a:p>
@@ -2405,7 +2405,7 @@
           <a:p>
             <a:fld id="{B11D0E9A-F31F-4A59-82D2-0D43B3059045}" type="datetimeFigureOut">
               <a:rPr lang="en-US" smtClean="0"/>
-              <a:t>26-Nov-17</a:t>
+              <a:t>27-Nov-17</a:t>
             </a:fld>
             <a:endParaRPr lang="en-US"/>
           </a:p>
@@ -2518,7 +2518,7 @@
           <a:p>
             <a:fld id="{B11D0E9A-F31F-4A59-82D2-0D43B3059045}" type="datetimeFigureOut">
               <a:rPr lang="en-US" smtClean="0"/>
-              <a:t>26-Nov-17</a:t>
+              <a:t>27-Nov-17</a:t>
             </a:fld>
             <a:endParaRPr lang="en-US"/>
           </a:p>
@@ -2829,7 +2829,7 @@
           <a:p>
             <a:fld id="{B11D0E9A-F31F-4A59-82D2-0D43B3059045}" type="datetimeFigureOut">
               <a:rPr lang="en-US" smtClean="0"/>
-              <a:t>26-Nov-17</a:t>
+              <a:t>27-Nov-17</a:t>
             </a:fld>
             <a:endParaRPr lang="en-US"/>
           </a:p>
@@ -3117,7 +3117,7 @@
           <a:p>
             <a:fld id="{B11D0E9A-F31F-4A59-82D2-0D43B3059045}" type="datetimeFigureOut">
               <a:rPr lang="en-US" smtClean="0"/>
-              <a:t>26-Nov-17</a:t>
+              <a:t>27-Nov-17</a:t>
             </a:fld>
             <a:endParaRPr lang="en-US"/>
           </a:p>
@@ -3358,7 +3358,7 @@
           <a:p>
             <a:fld id="{B11D0E9A-F31F-4A59-82D2-0D43B3059045}" type="datetimeFigureOut">
               <a:rPr lang="en-US" smtClean="0"/>
-              <a:t>26-Nov-17</a:t>
+              <a:t>27-Nov-17</a:t>
             </a:fld>
             <a:endParaRPr lang="en-US"/>
           </a:p>
@@ -5831,7 +5831,7 @@
         </p:nvSpPr>
         <p:spPr>
           <a:xfrm>
-            <a:off x="4850021" y="257636"/>
+            <a:off x="4828665" y="122418"/>
             <a:ext cx="2534669" cy="923330"/>
           </a:xfrm>
           <a:prstGeom prst="rect">
@@ -5865,100 +5865,1535 @@
           </a:p>
         </p:txBody>
       </p:sp>
-      <p:pic>
-        <p:nvPicPr>
-          <p:cNvPr id="6" name="Picture 5">
-            <a:extLst>
-              <a:ext uri="{FF2B5EF4-FFF2-40B4-BE49-F238E27FC236}">
-                <a16:creationId xmlns:a16="http://schemas.microsoft.com/office/drawing/2014/main" id="{04FF69BA-AAEC-4FB6-87DD-BF987A16A98C}"/>
-              </a:ext>
-            </a:extLst>
-          </p:cNvPr>
-          <p:cNvPicPr>
-            <a:picLocks noChangeAspect="1"/>
-          </p:cNvPicPr>
+      <p:graphicFrame>
+        <p:nvGraphicFramePr>
+          <p:cNvPr id="2" name="Table 1">
+            <a:extLst>
+              <a:ext uri="{FF2B5EF4-FFF2-40B4-BE49-F238E27FC236}">
+                <a16:creationId xmlns:a16="http://schemas.microsoft.com/office/drawing/2014/main" id="{4F0D2F18-D2F8-42D7-A9DC-14B88524FB6B}"/>
+              </a:ext>
+            </a:extLst>
+          </p:cNvPr>
+          <p:cNvGraphicFramePr>
+            <a:graphicFrameLocks noGrp="1"/>
+          </p:cNvGraphicFramePr>
+          <p:nvPr>
+            <p:extLst>
+              <p:ext uri="{D42A27DB-BD31-4B8C-83A1-F6EECF244321}">
+                <p14:modId xmlns:p14="http://schemas.microsoft.com/office/powerpoint/2010/main" val="915672708"/>
+              </p:ext>
+            </p:extLst>
+          </p:nvPr>
+        </p:nvGraphicFramePr>
+        <p:xfrm>
+          <a:off x="2256774" y="1045748"/>
+          <a:ext cx="8755410" cy="2605791"/>
+        </p:xfrm>
+        <a:graphic>
+          <a:graphicData uri="http://schemas.openxmlformats.org/drawingml/2006/table">
+            <a:tbl>
+              <a:tblPr firstRow="1" bandRow="1">
+                <a:tableStyleId>{5C22544A-7EE6-4342-B048-85BDC9FD1C3A}</a:tableStyleId>
+              </a:tblPr>
+              <a:tblGrid>
+                <a:gridCol w="2309568">
+                  <a:extLst>
+                    <a:ext uri="{9D8B030D-6E8A-4147-A177-3AD203B41FA5}">
+                      <a16:colId xmlns:a16="http://schemas.microsoft.com/office/drawing/2014/main" val="38408126"/>
+                    </a:ext>
+                  </a:extLst>
+                </a:gridCol>
+                <a:gridCol w="1338606">
+                  <a:extLst>
+                    <a:ext uri="{9D8B030D-6E8A-4147-A177-3AD203B41FA5}">
+                      <a16:colId xmlns:a16="http://schemas.microsoft.com/office/drawing/2014/main" val="385310842"/>
+                    </a:ext>
+                  </a:extLst>
+                </a:gridCol>
+                <a:gridCol w="1282045">
+                  <a:extLst>
+                    <a:ext uri="{9D8B030D-6E8A-4147-A177-3AD203B41FA5}">
+                      <a16:colId xmlns:a16="http://schemas.microsoft.com/office/drawing/2014/main" val="446739273"/>
+                    </a:ext>
+                  </a:extLst>
+                </a:gridCol>
+                <a:gridCol w="1329180">
+                  <a:extLst>
+                    <a:ext uri="{9D8B030D-6E8A-4147-A177-3AD203B41FA5}">
+                      <a16:colId xmlns:a16="http://schemas.microsoft.com/office/drawing/2014/main" val="1739644524"/>
+                    </a:ext>
+                  </a:extLst>
+                </a:gridCol>
+                <a:gridCol w="1300899">
+                  <a:extLst>
+                    <a:ext uri="{9D8B030D-6E8A-4147-A177-3AD203B41FA5}">
+                      <a16:colId xmlns:a16="http://schemas.microsoft.com/office/drawing/2014/main" val="2556170001"/>
+                    </a:ext>
+                  </a:extLst>
+                </a:gridCol>
+                <a:gridCol w="1195112">
+                  <a:extLst>
+                    <a:ext uri="{9D8B030D-6E8A-4147-A177-3AD203B41FA5}">
+                      <a16:colId xmlns:a16="http://schemas.microsoft.com/office/drawing/2014/main" val="1751010699"/>
+                    </a:ext>
+                  </a:extLst>
+                </a:gridCol>
+              </a:tblGrid>
+              <a:tr h="380751">
+                <a:tc>
+                  <a:txBody>
+                    <a:bodyPr/>
+                    <a:lstStyle/>
+                    <a:p>
+                      <a:endParaRPr lang="en-US" dirty="0"/>
+                    </a:p>
+                  </a:txBody>
+                  <a:tcPr/>
+                </a:tc>
+                <a:tc>
+                  <a:txBody>
+                    <a:bodyPr/>
+                    <a:lstStyle/>
+                    <a:p>
+                      <a:pPr algn="ctr"/>
+                      <a:r>
+                        <a:rPr lang="en-US" dirty="0"/>
+                        <a:t>LOC</a:t>
+                      </a:r>
+                    </a:p>
+                  </a:txBody>
+                  <a:tcPr/>
+                </a:tc>
+                <a:tc>
+                  <a:txBody>
+                    <a:bodyPr/>
+                    <a:lstStyle/>
+                    <a:p>
+                      <a:pPr algn="ctr"/>
+                      <a:r>
+                        <a:rPr lang="en-US" dirty="0"/>
+                        <a:t>MISC</a:t>
+                      </a:r>
+                    </a:p>
+                  </a:txBody>
+                  <a:tcPr/>
+                </a:tc>
+                <a:tc>
+                  <a:txBody>
+                    <a:bodyPr/>
+                    <a:lstStyle/>
+                    <a:p>
+                      <a:pPr algn="ctr"/>
+                      <a:r>
+                        <a:rPr lang="en-US" dirty="0"/>
+                        <a:t>ORG</a:t>
+                      </a:r>
+                    </a:p>
+                  </a:txBody>
+                  <a:tcPr/>
+                </a:tc>
+                <a:tc>
+                  <a:txBody>
+                    <a:bodyPr/>
+                    <a:lstStyle/>
+                    <a:p>
+                      <a:pPr algn="ctr"/>
+                      <a:r>
+                        <a:rPr lang="en-US" dirty="0"/>
+                        <a:t>PER</a:t>
+                      </a:r>
+                    </a:p>
+                  </a:txBody>
+                  <a:tcPr/>
+                </a:tc>
+                <a:tc>
+                  <a:txBody>
+                    <a:bodyPr/>
+                    <a:lstStyle/>
+                    <a:p>
+                      <a:pPr algn="ctr"/>
+                      <a:r>
+                        <a:rPr lang="en-US" dirty="0"/>
+                        <a:t>overall</a:t>
+                      </a:r>
+                    </a:p>
+                  </a:txBody>
+                  <a:tcPr/>
+                </a:tc>
+                <a:extLst>
+                  <a:ext uri="{0D108BD9-81ED-4DB2-BD59-A6C34878D82A}">
+                    <a16:rowId xmlns:a16="http://schemas.microsoft.com/office/drawing/2014/main" val="2193677456"/>
+                  </a:ext>
+                </a:extLst>
+              </a:tr>
+              <a:tr h="370840">
+                <a:tc>
+                  <a:txBody>
+                    <a:bodyPr/>
+                    <a:lstStyle/>
+                    <a:p>
+                      <a:r>
+                        <a:rPr lang="en-US" dirty="0"/>
+                        <a:t>State Of The Art 2003</a:t>
+                      </a:r>
+                    </a:p>
+                  </a:txBody>
+                  <a:tcPr/>
+                </a:tc>
+                <a:tc>
+                  <a:txBody>
+                    <a:bodyPr/>
+                    <a:lstStyle/>
+                    <a:p>
+                      <a:pPr algn="ctr"/>
+                      <a:r>
+                        <a:rPr lang="en-US" dirty="0"/>
+                        <a:t>91.15</a:t>
+                      </a:r>
+                    </a:p>
+                  </a:txBody>
+                  <a:tcPr/>
+                </a:tc>
+                <a:tc>
+                  <a:txBody>
+                    <a:bodyPr/>
+                    <a:lstStyle/>
+                    <a:p>
+                      <a:pPr algn="ctr"/>
+                      <a:r>
+                        <a:rPr lang="en-US" dirty="0"/>
+                        <a:t>80.44</a:t>
+                      </a:r>
+                    </a:p>
+                  </a:txBody>
+                  <a:tcPr/>
+                </a:tc>
+                <a:tc>
+                  <a:txBody>
+                    <a:bodyPr/>
+                    <a:lstStyle/>
+                    <a:p>
+                      <a:pPr algn="ctr"/>
+                      <a:r>
+                        <a:rPr lang="en-US" dirty="0"/>
+                        <a:t>84.67</a:t>
+                      </a:r>
+                    </a:p>
+                  </a:txBody>
+                  <a:tcPr/>
+                </a:tc>
+                <a:tc>
+                  <a:txBody>
+                    <a:bodyPr/>
+                    <a:lstStyle/>
+                    <a:p>
+                      <a:pPr algn="ctr"/>
+                      <a:r>
+                        <a:rPr lang="en-US" dirty="0"/>
+                        <a:t>93.85</a:t>
+                      </a:r>
+                    </a:p>
+                  </a:txBody>
+                  <a:tcPr/>
+                </a:tc>
+                <a:tc>
+                  <a:txBody>
+                    <a:bodyPr/>
+                    <a:lstStyle/>
+                    <a:p>
+                      <a:pPr algn="ctr"/>
+                      <a:r>
+                        <a:rPr lang="en-US" dirty="0"/>
+                        <a:t>88.76</a:t>
+                      </a:r>
+                    </a:p>
+                  </a:txBody>
+                  <a:tcPr/>
+                </a:tc>
+                <a:extLst>
+                  <a:ext uri="{0D108BD9-81ED-4DB2-BD59-A6C34878D82A}">
+                    <a16:rowId xmlns:a16="http://schemas.microsoft.com/office/drawing/2014/main" val="1755523628"/>
+                  </a:ext>
+                </a:extLst>
+              </a:tr>
+              <a:tr h="370840">
+                <a:tc>
+                  <a:txBody>
+                    <a:bodyPr/>
+                    <a:lstStyle/>
+                    <a:p>
+                      <a:pPr marL="0" marR="0" lvl="0" indent="0" algn="l" defTabSz="914400" rtl="0" eaLnBrk="1" fontAlgn="auto" latinLnBrk="0" hangingPunct="1">
+                        <a:lnSpc>
+                          <a:spcPct val="100000"/>
+                        </a:lnSpc>
+                        <a:spcBef>
+                          <a:spcPts val="0"/>
+                        </a:spcBef>
+                        <a:spcAft>
+                          <a:spcPts val="0"/>
+                        </a:spcAft>
+                        <a:buClrTx/>
+                        <a:buSzTx/>
+                        <a:buFontTx/>
+                        <a:buNone/>
+                        <a:tabLst/>
+                        <a:defRPr/>
+                      </a:pPr>
+                      <a:r>
+                        <a:rPr lang="en-US" dirty="0"/>
+                        <a:t>State Of The Art NEW</a:t>
+                      </a:r>
+                    </a:p>
+                  </a:txBody>
+                  <a:tcPr/>
+                </a:tc>
+                <a:tc>
+                  <a:txBody>
+                    <a:bodyPr/>
+                    <a:lstStyle/>
+                    <a:p>
+                      <a:pPr algn="ctr"/>
+                      <a:endParaRPr lang="en-US" dirty="0"/>
+                    </a:p>
+                  </a:txBody>
+                  <a:tcPr/>
+                </a:tc>
+                <a:tc>
+                  <a:txBody>
+                    <a:bodyPr/>
+                    <a:lstStyle/>
+                    <a:p>
+                      <a:pPr algn="ctr"/>
+                      <a:endParaRPr lang="en-US" dirty="0"/>
+                    </a:p>
+                  </a:txBody>
+                  <a:tcPr/>
+                </a:tc>
+                <a:tc>
+                  <a:txBody>
+                    <a:bodyPr/>
+                    <a:lstStyle/>
+                    <a:p>
+                      <a:pPr algn="ctr"/>
+                      <a:endParaRPr lang="en-US"/>
+                    </a:p>
+                  </a:txBody>
+                  <a:tcPr/>
+                </a:tc>
+                <a:tc>
+                  <a:txBody>
+                    <a:bodyPr/>
+                    <a:lstStyle/>
+                    <a:p>
+                      <a:pPr algn="ctr"/>
+                      <a:endParaRPr lang="en-US"/>
+                    </a:p>
+                  </a:txBody>
+                  <a:tcPr/>
+                </a:tc>
+                <a:tc>
+                  <a:txBody>
+                    <a:bodyPr/>
+                    <a:lstStyle/>
+                    <a:p>
+                      <a:pPr algn="ctr"/>
+                      <a:r>
+                        <a:rPr lang="en-US" dirty="0"/>
+                        <a:t>91.21</a:t>
+                      </a:r>
+                    </a:p>
+                  </a:txBody>
+                  <a:tcPr/>
+                </a:tc>
+                <a:extLst>
+                  <a:ext uri="{0D108BD9-81ED-4DB2-BD59-A6C34878D82A}">
+                    <a16:rowId xmlns:a16="http://schemas.microsoft.com/office/drawing/2014/main" val="4097086535"/>
+                  </a:ext>
+                </a:extLst>
+              </a:tr>
+              <a:tr h="370840">
+                <a:tc>
+                  <a:txBody>
+                    <a:bodyPr/>
+                    <a:lstStyle/>
+                    <a:p>
+                      <a:r>
+                        <a:rPr lang="en-US" dirty="0" err="1"/>
+                        <a:t>LogRegression</a:t>
+                      </a:r>
+                      <a:endParaRPr lang="en-US" dirty="0"/>
+                    </a:p>
+                  </a:txBody>
+                  <a:tcPr/>
+                </a:tc>
+                <a:tc>
+                  <a:txBody>
+                    <a:bodyPr/>
+                    <a:lstStyle/>
+                    <a:p>
+                      <a:pPr algn="ctr"/>
+                      <a:r>
+                        <a:rPr lang="en-US" dirty="0"/>
+                        <a:t>82.0</a:t>
+                      </a:r>
+                    </a:p>
+                  </a:txBody>
+                  <a:tcPr/>
+                </a:tc>
+                <a:tc>
+                  <a:txBody>
+                    <a:bodyPr/>
+                    <a:lstStyle/>
+                    <a:p>
+                      <a:pPr algn="ctr"/>
+                      <a:r>
+                        <a:rPr lang="en-US" dirty="0"/>
+                        <a:t>78.7</a:t>
+                      </a:r>
+                    </a:p>
+                  </a:txBody>
+                  <a:tcPr/>
+                </a:tc>
+                <a:tc>
+                  <a:txBody>
+                    <a:bodyPr/>
+                    <a:lstStyle/>
+                    <a:p>
+                      <a:pPr algn="ctr"/>
+                      <a:r>
+                        <a:rPr lang="en-US" dirty="0"/>
+                        <a:t>76.0</a:t>
+                      </a:r>
+                    </a:p>
+                  </a:txBody>
+                  <a:tcPr/>
+                </a:tc>
+                <a:tc>
+                  <a:txBody>
+                    <a:bodyPr/>
+                    <a:lstStyle/>
+                    <a:p>
+                      <a:pPr algn="ctr"/>
+                      <a:r>
+                        <a:rPr lang="en-US" dirty="0">
+                          <a:solidFill>
+                            <a:srgbClr val="FF0000"/>
+                          </a:solidFill>
+                        </a:rPr>
+                        <a:t>88.8</a:t>
+                      </a:r>
+                    </a:p>
+                  </a:txBody>
+                  <a:tcPr/>
+                </a:tc>
+                <a:tc>
+                  <a:txBody>
+                    <a:bodyPr/>
+                    <a:lstStyle/>
+                    <a:p>
+                      <a:pPr algn="ctr"/>
+                      <a:r>
+                        <a:rPr lang="en-US" dirty="0"/>
+                        <a:t>82.6</a:t>
+                      </a:r>
+                    </a:p>
+                  </a:txBody>
+                  <a:tcPr/>
+                </a:tc>
+                <a:extLst>
+                  <a:ext uri="{0D108BD9-81ED-4DB2-BD59-A6C34878D82A}">
+                    <a16:rowId xmlns:a16="http://schemas.microsoft.com/office/drawing/2014/main" val="4278054734"/>
+                  </a:ext>
+                </a:extLst>
+              </a:tr>
+              <a:tr h="370840">
+                <a:tc>
+                  <a:txBody>
+                    <a:bodyPr/>
+                    <a:lstStyle/>
+                    <a:p>
+                      <a:r>
+                        <a:rPr lang="en-US" dirty="0" err="1"/>
+                        <a:t>RandomForest</a:t>
+                      </a:r>
+                      <a:endParaRPr lang="en-US" dirty="0"/>
+                    </a:p>
+                  </a:txBody>
+                  <a:tcPr/>
+                </a:tc>
+                <a:tc>
+                  <a:txBody>
+                    <a:bodyPr/>
+                    <a:lstStyle/>
+                    <a:p>
+                      <a:pPr algn="ctr"/>
+                      <a:r>
+                        <a:rPr lang="ru-RU" dirty="0"/>
+                        <a:t>72</a:t>
+                      </a:r>
+                      <a:r>
+                        <a:rPr lang="en-US" dirty="0"/>
+                        <a:t>.5</a:t>
+                      </a:r>
+                    </a:p>
+                  </a:txBody>
+                  <a:tcPr/>
+                </a:tc>
+                <a:tc>
+                  <a:txBody>
+                    <a:bodyPr/>
+                    <a:lstStyle/>
+                    <a:p>
+                      <a:pPr algn="ctr"/>
+                      <a:r>
+                        <a:rPr lang="en-US" dirty="0"/>
+                        <a:t>68.2</a:t>
+                      </a:r>
+                    </a:p>
+                  </a:txBody>
+                  <a:tcPr/>
+                </a:tc>
+                <a:tc>
+                  <a:txBody>
+                    <a:bodyPr/>
+                    <a:lstStyle/>
+                    <a:p>
+                      <a:pPr algn="ctr"/>
+                      <a:r>
+                        <a:rPr lang="en-US" dirty="0"/>
+                        <a:t>67.6</a:t>
+                      </a:r>
+                    </a:p>
+                  </a:txBody>
+                  <a:tcPr/>
+                </a:tc>
+                <a:tc>
+                  <a:txBody>
+                    <a:bodyPr/>
+                    <a:lstStyle/>
+                    <a:p>
+                      <a:pPr algn="ctr"/>
+                      <a:r>
+                        <a:rPr lang="en-US" dirty="0"/>
+                        <a:t>84.9</a:t>
+                      </a:r>
+                    </a:p>
+                  </a:txBody>
+                  <a:tcPr/>
+                </a:tc>
+                <a:tc>
+                  <a:txBody>
+                    <a:bodyPr/>
+                    <a:lstStyle/>
+                    <a:p>
+                      <a:pPr algn="ctr"/>
+                      <a:r>
+                        <a:rPr lang="en-US" dirty="0"/>
+                        <a:t>75.</a:t>
+                      </a:r>
+                      <a:r>
+                        <a:rPr lang="ru-RU" dirty="0"/>
+                        <a:t>2</a:t>
+                      </a:r>
+                      <a:endParaRPr lang="en-US" dirty="0"/>
+                    </a:p>
+                  </a:txBody>
+                  <a:tcPr/>
+                </a:tc>
+                <a:extLst>
+                  <a:ext uri="{0D108BD9-81ED-4DB2-BD59-A6C34878D82A}">
+                    <a16:rowId xmlns:a16="http://schemas.microsoft.com/office/drawing/2014/main" val="729158528"/>
+                  </a:ext>
+                </a:extLst>
+              </a:tr>
+              <a:tr h="370840">
+                <a:tc>
+                  <a:txBody>
+                    <a:bodyPr/>
+                    <a:lstStyle/>
+                    <a:p>
+                      <a:r>
+                        <a:rPr lang="en-US" dirty="0" err="1"/>
+                        <a:t>LinearSVC</a:t>
+                      </a:r>
+                      <a:endParaRPr lang="en-US" dirty="0"/>
+                    </a:p>
+                  </a:txBody>
+                  <a:tcPr/>
+                </a:tc>
+                <a:tc>
+                  <a:txBody>
+                    <a:bodyPr/>
+                    <a:lstStyle/>
+                    <a:p>
+                      <a:pPr algn="ctr"/>
+                      <a:r>
+                        <a:rPr lang="en-US" dirty="0">
+                          <a:solidFill>
+                            <a:srgbClr val="FF0000"/>
+                          </a:solidFill>
+                        </a:rPr>
+                        <a:t>82.3</a:t>
+                      </a:r>
+                    </a:p>
+                  </a:txBody>
+                  <a:tcPr/>
+                </a:tc>
+                <a:tc>
+                  <a:txBody>
+                    <a:bodyPr/>
+                    <a:lstStyle/>
+                    <a:p>
+                      <a:pPr algn="ctr"/>
+                      <a:r>
+                        <a:rPr lang="en-US" dirty="0">
+                          <a:solidFill>
+                            <a:srgbClr val="FF0000"/>
+                          </a:solidFill>
+                        </a:rPr>
+                        <a:t>79.9</a:t>
+                      </a:r>
+                    </a:p>
+                  </a:txBody>
+                  <a:tcPr/>
+                </a:tc>
+                <a:tc>
+                  <a:txBody>
+                    <a:bodyPr/>
+                    <a:lstStyle/>
+                    <a:p>
+                      <a:pPr algn="ctr"/>
+                      <a:r>
+                        <a:rPr lang="en-US" dirty="0">
+                          <a:solidFill>
+                            <a:srgbClr val="FF0000"/>
+                          </a:solidFill>
+                        </a:rPr>
+                        <a:t>77.7</a:t>
+                      </a:r>
+                    </a:p>
+                  </a:txBody>
+                  <a:tcPr/>
+                </a:tc>
+                <a:tc>
+                  <a:txBody>
+                    <a:bodyPr/>
+                    <a:lstStyle/>
+                    <a:p>
+                      <a:pPr algn="ctr"/>
+                      <a:r>
+                        <a:rPr lang="en-US" dirty="0"/>
+                        <a:t>88.7</a:t>
+                      </a:r>
+                    </a:p>
+                  </a:txBody>
+                  <a:tcPr/>
+                </a:tc>
+                <a:tc>
+                  <a:txBody>
+                    <a:bodyPr/>
+                    <a:lstStyle/>
+                    <a:p>
+                      <a:pPr algn="ctr"/>
+                      <a:r>
+                        <a:rPr lang="en-US" dirty="0">
+                          <a:solidFill>
+                            <a:srgbClr val="FF0000"/>
+                          </a:solidFill>
+                        </a:rPr>
+                        <a:t>83.2</a:t>
+                      </a:r>
+                    </a:p>
+                  </a:txBody>
+                  <a:tcPr/>
+                </a:tc>
+                <a:extLst>
+                  <a:ext uri="{0D108BD9-81ED-4DB2-BD59-A6C34878D82A}">
+                    <a16:rowId xmlns:a16="http://schemas.microsoft.com/office/drawing/2014/main" val="433948239"/>
+                  </a:ext>
+                </a:extLst>
+              </a:tr>
+              <a:tr h="370840">
+                <a:tc>
+                  <a:txBody>
+                    <a:bodyPr/>
+                    <a:lstStyle/>
+                    <a:p>
+                      <a:r>
+                        <a:rPr lang="en-US" dirty="0" err="1"/>
+                        <a:t>GBoosting</a:t>
+                      </a:r>
+                      <a:endParaRPr lang="en-US" dirty="0"/>
+                    </a:p>
+                  </a:txBody>
+                  <a:tcPr/>
+                </a:tc>
+                <a:tc>
+                  <a:txBody>
+                    <a:bodyPr/>
+                    <a:lstStyle/>
+                    <a:p>
+                      <a:pPr algn="ctr"/>
+                      <a:r>
+                        <a:rPr lang="en-US" dirty="0"/>
+                        <a:t>72.9</a:t>
+                      </a:r>
+                    </a:p>
+                  </a:txBody>
+                  <a:tcPr/>
+                </a:tc>
+                <a:tc>
+                  <a:txBody>
+                    <a:bodyPr/>
+                    <a:lstStyle/>
+                    <a:p>
+                      <a:pPr algn="ctr"/>
+                      <a:r>
+                        <a:rPr lang="en-US" dirty="0"/>
+                        <a:t>74.8</a:t>
+                      </a:r>
+                    </a:p>
+                  </a:txBody>
+                  <a:tcPr/>
+                </a:tc>
+                <a:tc>
+                  <a:txBody>
+                    <a:bodyPr/>
+                    <a:lstStyle/>
+                    <a:p>
+                      <a:pPr algn="ctr"/>
+                      <a:r>
+                        <a:rPr lang="en-US" dirty="0"/>
+                        <a:t>67.7</a:t>
+                      </a:r>
+                    </a:p>
+                  </a:txBody>
+                  <a:tcPr/>
+                </a:tc>
+                <a:tc>
+                  <a:txBody>
+                    <a:bodyPr/>
+                    <a:lstStyle/>
+                    <a:p>
+                      <a:pPr algn="ctr"/>
+                      <a:r>
+                        <a:rPr lang="en-US" dirty="0"/>
+                        <a:t>83.4</a:t>
+                      </a:r>
+                    </a:p>
+                  </a:txBody>
+                  <a:tcPr/>
+                </a:tc>
+                <a:tc>
+                  <a:txBody>
+                    <a:bodyPr/>
+                    <a:lstStyle/>
+                    <a:p>
+                      <a:pPr algn="ctr"/>
+                      <a:r>
+                        <a:rPr lang="en-US" dirty="0"/>
+                        <a:t>75.8</a:t>
+                      </a:r>
+                    </a:p>
+                  </a:txBody>
+                  <a:tcPr/>
+                </a:tc>
+                <a:extLst>
+                  <a:ext uri="{0D108BD9-81ED-4DB2-BD59-A6C34878D82A}">
+                    <a16:rowId xmlns:a16="http://schemas.microsoft.com/office/drawing/2014/main" val="210600965"/>
+                  </a:ext>
+                </a:extLst>
+              </a:tr>
+            </a:tbl>
+          </a:graphicData>
+        </a:graphic>
+      </p:graphicFrame>
+      <p:sp>
+        <p:nvSpPr>
+          <p:cNvPr id="7" name="Rectangle 6">
+            <a:extLst>
+              <a:ext uri="{FF2B5EF4-FFF2-40B4-BE49-F238E27FC236}">
+                <a16:creationId xmlns:a16="http://schemas.microsoft.com/office/drawing/2014/main" id="{E0581DA2-5D49-4834-83DE-A5084835AB8C}"/>
+              </a:ext>
+            </a:extLst>
+          </p:cNvPr>
+          <p:cNvSpPr/>
           <p:nvPr/>
-        </p:nvPicPr>
-        <p:blipFill>
-          <a:blip r:embed="rId2"/>
-          <a:stretch>
-            <a:fillRect/>
-          </a:stretch>
-        </p:blipFill>
+        </p:nvSpPr>
         <p:spPr>
           <a:xfrm>
-            <a:off x="1072119" y="1661765"/>
-            <a:ext cx="5023881" cy="4145146"/>
+            <a:off x="427427" y="1045748"/>
+            <a:ext cx="1829347" cy="400110"/>
           </a:xfrm>
           <a:prstGeom prst="rect">
             <a:avLst/>
           </a:prstGeom>
+          <a:noFill/>
         </p:spPr>
-      </p:pic>
-      <p:pic>
-        <p:nvPicPr>
-          <p:cNvPr id="8" name="Picture 7">
-            <a:extLst>
-              <a:ext uri="{FF2B5EF4-FFF2-40B4-BE49-F238E27FC236}">
-                <a16:creationId xmlns:a16="http://schemas.microsoft.com/office/drawing/2014/main" id="{01BCC8CA-64A0-4717-8415-4E03E88A08EE}"/>
-              </a:ext>
-            </a:extLst>
-          </p:cNvPr>
-          <p:cNvPicPr>
-            <a:picLocks noChangeAspect="1"/>
-          </p:cNvPicPr>
+        <p:txBody>
+          <a:bodyPr wrap="square" lIns="91440" tIns="45720" rIns="91440" bIns="45720">
+            <a:spAutoFit/>
+          </a:bodyPr>
+          <a:lstStyle/>
+          <a:p>
+            <a:pPr algn="ctr"/>
+            <a:r>
+              <a:rPr lang="en-US" sz="2000" b="0" cap="none" spc="0" dirty="0">
+                <a:ln w="0"/>
+                <a:solidFill>
+                  <a:schemeClr val="tx1"/>
+                </a:solidFill>
+                <a:effectLst>
+                  <a:outerShdw blurRad="38100" dist="19050" dir="2700000" algn="tl" rotWithShape="0">
+                    <a:schemeClr val="dk1">
+                      <a:alpha val="40000"/>
+                    </a:schemeClr>
+                  </a:outerShdw>
+                </a:effectLst>
+              </a:rPr>
+              <a:t>CoNLL2003</a:t>
+            </a:r>
+          </a:p>
+        </p:txBody>
+      </p:sp>
+      <p:graphicFrame>
+        <p:nvGraphicFramePr>
+          <p:cNvPr id="12" name="Table 11">
+            <a:extLst>
+              <a:ext uri="{FF2B5EF4-FFF2-40B4-BE49-F238E27FC236}">
+                <a16:creationId xmlns:a16="http://schemas.microsoft.com/office/drawing/2014/main" id="{BFCED984-AEA6-49DF-A50E-2C215DEE6903}"/>
+              </a:ext>
+            </a:extLst>
+          </p:cNvPr>
+          <p:cNvGraphicFramePr>
+            <a:graphicFrameLocks noGrp="1"/>
+          </p:cNvGraphicFramePr>
+          <p:nvPr>
+            <p:extLst>
+              <p:ext uri="{D42A27DB-BD31-4B8C-83A1-F6EECF244321}">
+                <p14:modId xmlns:p14="http://schemas.microsoft.com/office/powerpoint/2010/main" val="1040708914"/>
+              </p:ext>
+            </p:extLst>
+          </p:nvPr>
+        </p:nvGraphicFramePr>
+        <p:xfrm>
+          <a:off x="2256774" y="3906271"/>
+          <a:ext cx="8755409" cy="2219960"/>
+        </p:xfrm>
+        <a:graphic>
+          <a:graphicData uri="http://schemas.openxmlformats.org/drawingml/2006/table">
+            <a:tbl>
+              <a:tblPr firstRow="1" bandRow="1">
+                <a:tableStyleId>{5C22544A-7EE6-4342-B048-85BDC9FD1C3A}</a:tableStyleId>
+              </a:tblPr>
+              <a:tblGrid>
+                <a:gridCol w="2315226">
+                  <a:extLst>
+                    <a:ext uri="{9D8B030D-6E8A-4147-A177-3AD203B41FA5}">
+                      <a16:colId xmlns:a16="http://schemas.microsoft.com/office/drawing/2014/main" val="38408126"/>
+                    </a:ext>
+                  </a:extLst>
+                </a:gridCol>
+                <a:gridCol w="1330960">
+                  <a:extLst>
+                    <a:ext uri="{9D8B030D-6E8A-4147-A177-3AD203B41FA5}">
+                      <a16:colId xmlns:a16="http://schemas.microsoft.com/office/drawing/2014/main" val="385310842"/>
+                    </a:ext>
+                  </a:extLst>
+                </a:gridCol>
+                <a:gridCol w="1300480">
+                  <a:extLst>
+                    <a:ext uri="{9D8B030D-6E8A-4147-A177-3AD203B41FA5}">
+                      <a16:colId xmlns:a16="http://schemas.microsoft.com/office/drawing/2014/main" val="446739273"/>
+                    </a:ext>
+                  </a:extLst>
+                </a:gridCol>
+                <a:gridCol w="1320800">
+                  <a:extLst>
+                    <a:ext uri="{9D8B030D-6E8A-4147-A177-3AD203B41FA5}">
+                      <a16:colId xmlns:a16="http://schemas.microsoft.com/office/drawing/2014/main" val="1739644524"/>
+                    </a:ext>
+                  </a:extLst>
+                </a:gridCol>
+                <a:gridCol w="1280160">
+                  <a:extLst>
+                    <a:ext uri="{9D8B030D-6E8A-4147-A177-3AD203B41FA5}">
+                      <a16:colId xmlns:a16="http://schemas.microsoft.com/office/drawing/2014/main" val="2556170001"/>
+                    </a:ext>
+                  </a:extLst>
+                </a:gridCol>
+                <a:gridCol w="1207783">
+                  <a:extLst>
+                    <a:ext uri="{9D8B030D-6E8A-4147-A177-3AD203B41FA5}">
+                      <a16:colId xmlns:a16="http://schemas.microsoft.com/office/drawing/2014/main" val="1751010699"/>
+                    </a:ext>
+                  </a:extLst>
+                </a:gridCol>
+              </a:tblGrid>
+              <a:tr h="314711">
+                <a:tc>
+                  <a:txBody>
+                    <a:bodyPr/>
+                    <a:lstStyle/>
+                    <a:p>
+                      <a:endParaRPr lang="en-US" dirty="0"/>
+                    </a:p>
+                  </a:txBody>
+                  <a:tcPr/>
+                </a:tc>
+                <a:tc>
+                  <a:txBody>
+                    <a:bodyPr/>
+                    <a:lstStyle/>
+                    <a:p>
+                      <a:pPr algn="ctr"/>
+                      <a:r>
+                        <a:rPr lang="en-US" dirty="0"/>
+                        <a:t>LOC</a:t>
+                      </a:r>
+                    </a:p>
+                  </a:txBody>
+                  <a:tcPr/>
+                </a:tc>
+                <a:tc>
+                  <a:txBody>
+                    <a:bodyPr/>
+                    <a:lstStyle/>
+                    <a:p>
+                      <a:pPr algn="ctr"/>
+                      <a:r>
+                        <a:rPr lang="en-US" dirty="0"/>
+                        <a:t>LOCORG</a:t>
+                      </a:r>
+                    </a:p>
+                  </a:txBody>
+                  <a:tcPr/>
+                </a:tc>
+                <a:tc>
+                  <a:txBody>
+                    <a:bodyPr/>
+                    <a:lstStyle/>
+                    <a:p>
+                      <a:pPr algn="ctr"/>
+                      <a:r>
+                        <a:rPr lang="en-US" dirty="0"/>
+                        <a:t>ORG</a:t>
+                      </a:r>
+                    </a:p>
+                  </a:txBody>
+                  <a:tcPr/>
+                </a:tc>
+                <a:tc>
+                  <a:txBody>
+                    <a:bodyPr/>
+                    <a:lstStyle/>
+                    <a:p>
+                      <a:pPr algn="ctr"/>
+                      <a:r>
+                        <a:rPr lang="en-US" dirty="0"/>
+                        <a:t>PER</a:t>
+                      </a:r>
+                    </a:p>
+                  </a:txBody>
+                  <a:tcPr/>
+                </a:tc>
+                <a:tc>
+                  <a:txBody>
+                    <a:bodyPr/>
+                    <a:lstStyle/>
+                    <a:p>
+                      <a:pPr algn="ctr"/>
+                      <a:r>
+                        <a:rPr lang="en-US" dirty="0"/>
+                        <a:t>overall</a:t>
+                      </a:r>
+                    </a:p>
+                  </a:txBody>
+                  <a:tcPr/>
+                </a:tc>
+                <a:extLst>
+                  <a:ext uri="{0D108BD9-81ED-4DB2-BD59-A6C34878D82A}">
+                    <a16:rowId xmlns:a16="http://schemas.microsoft.com/office/drawing/2014/main" val="2193677456"/>
+                  </a:ext>
+                </a:extLst>
+              </a:tr>
+              <a:tr h="370840">
+                <a:tc>
+                  <a:txBody>
+                    <a:bodyPr/>
+                    <a:lstStyle/>
+                    <a:p>
+                      <a:pPr marL="0" marR="0" lvl="0" indent="0" algn="l" defTabSz="914400" rtl="0" eaLnBrk="1" fontAlgn="auto" latinLnBrk="0" hangingPunct="1">
+                        <a:lnSpc>
+                          <a:spcPct val="100000"/>
+                        </a:lnSpc>
+                        <a:spcBef>
+                          <a:spcPts val="0"/>
+                        </a:spcBef>
+                        <a:spcAft>
+                          <a:spcPts val="0"/>
+                        </a:spcAft>
+                        <a:buClrTx/>
+                        <a:buSzTx/>
+                        <a:buFontTx/>
+                        <a:buNone/>
+                        <a:tabLst/>
+                        <a:defRPr/>
+                      </a:pPr>
+                      <a:r>
+                        <a:rPr lang="en-US" dirty="0"/>
+                        <a:t>State Of The Art</a:t>
+                      </a:r>
+                    </a:p>
+                  </a:txBody>
+                  <a:tcPr/>
+                </a:tc>
+                <a:tc>
+                  <a:txBody>
+                    <a:bodyPr/>
+                    <a:lstStyle/>
+                    <a:p>
+                      <a:pPr algn="ctr"/>
+                      <a:r>
+                        <a:rPr lang="en-US" dirty="0"/>
+                        <a:t>70.98</a:t>
+                      </a:r>
+                    </a:p>
+                  </a:txBody>
+                  <a:tcPr/>
+                </a:tc>
+                <a:tc>
+                  <a:txBody>
+                    <a:bodyPr/>
+                    <a:lstStyle/>
+                    <a:p>
+                      <a:pPr marL="0" marR="0" lvl="0" indent="0" algn="ctr" defTabSz="914400" rtl="0" eaLnBrk="1" fontAlgn="auto" latinLnBrk="0" hangingPunct="1">
+                        <a:lnSpc>
+                          <a:spcPct val="100000"/>
+                        </a:lnSpc>
+                        <a:spcBef>
+                          <a:spcPts val="0"/>
+                        </a:spcBef>
+                        <a:spcAft>
+                          <a:spcPts val="0"/>
+                        </a:spcAft>
+                        <a:buClrTx/>
+                        <a:buSzTx/>
+                        <a:buFontTx/>
+                        <a:buNone/>
+                        <a:tabLst/>
+                        <a:defRPr/>
+                      </a:pPr>
+                      <a:r>
+                        <a:rPr lang="en-US" dirty="0"/>
+                        <a:t>75.42</a:t>
+                      </a:r>
+                    </a:p>
+                  </a:txBody>
+                  <a:tcPr/>
+                </a:tc>
+                <a:tc>
+                  <a:txBody>
+                    <a:bodyPr/>
+                    <a:lstStyle/>
+                    <a:p>
+                      <a:pPr algn="ctr"/>
+                      <a:r>
+                        <a:rPr lang="en-US" dirty="0"/>
+                        <a:t>71.37</a:t>
+                      </a:r>
+                    </a:p>
+                  </a:txBody>
+                  <a:tcPr/>
+                </a:tc>
+                <a:tc>
+                  <a:txBody>
+                    <a:bodyPr/>
+                    <a:lstStyle/>
+                    <a:p>
+                      <a:pPr algn="ctr"/>
+                      <a:r>
+                        <a:rPr lang="en-US" dirty="0"/>
+                        <a:t>89.95</a:t>
+                      </a:r>
+                    </a:p>
+                  </a:txBody>
+                  <a:tcPr/>
+                </a:tc>
+                <a:tc>
+                  <a:txBody>
+                    <a:bodyPr/>
+                    <a:lstStyle/>
+                    <a:p>
+                      <a:pPr algn="ctr"/>
+                      <a:r>
+                        <a:rPr lang="en-US" dirty="0"/>
+                        <a:t>78.10</a:t>
+                      </a:r>
+                    </a:p>
+                  </a:txBody>
+                  <a:tcPr/>
+                </a:tc>
+                <a:extLst>
+                  <a:ext uri="{0D108BD9-81ED-4DB2-BD59-A6C34878D82A}">
+                    <a16:rowId xmlns:a16="http://schemas.microsoft.com/office/drawing/2014/main" val="4097086535"/>
+                  </a:ext>
+                </a:extLst>
+              </a:tr>
+              <a:tr h="370840">
+                <a:tc>
+                  <a:txBody>
+                    <a:bodyPr/>
+                    <a:lstStyle/>
+                    <a:p>
+                      <a:r>
+                        <a:rPr lang="en-US" dirty="0" err="1"/>
+                        <a:t>LogRegression</a:t>
+                      </a:r>
+                      <a:endParaRPr lang="en-US" dirty="0"/>
+                    </a:p>
+                  </a:txBody>
+                  <a:tcPr/>
+                </a:tc>
+                <a:tc>
+                  <a:txBody>
+                    <a:bodyPr/>
+                    <a:lstStyle/>
+                    <a:p>
+                      <a:pPr algn="ctr"/>
+                      <a:r>
+                        <a:rPr lang="en-US" dirty="0"/>
+                        <a:t>55.1</a:t>
+                      </a:r>
+                    </a:p>
+                  </a:txBody>
+                  <a:tcPr/>
+                </a:tc>
+                <a:tc>
+                  <a:txBody>
+                    <a:bodyPr/>
+                    <a:lstStyle/>
+                    <a:p>
+                      <a:pPr algn="ctr"/>
+                      <a:r>
+                        <a:rPr lang="en-US" dirty="0"/>
+                        <a:t>55.5</a:t>
+                      </a:r>
+                    </a:p>
+                  </a:txBody>
+                  <a:tcPr/>
+                </a:tc>
+                <a:tc>
+                  <a:txBody>
+                    <a:bodyPr/>
+                    <a:lstStyle/>
+                    <a:p>
+                      <a:pPr algn="ctr"/>
+                      <a:r>
+                        <a:rPr lang="en-US" dirty="0"/>
+                        <a:t>46.0</a:t>
+                      </a:r>
+                    </a:p>
+                  </a:txBody>
+                  <a:tcPr/>
+                </a:tc>
+                <a:tc>
+                  <a:txBody>
+                    <a:bodyPr/>
+                    <a:lstStyle/>
+                    <a:p>
+                      <a:pPr algn="ctr"/>
+                      <a:r>
+                        <a:rPr lang="en-US" dirty="0">
+                          <a:solidFill>
+                            <a:schemeClr val="tx1"/>
+                          </a:solidFill>
+                        </a:rPr>
+                        <a:t>80.2</a:t>
+                      </a:r>
+                    </a:p>
+                  </a:txBody>
+                  <a:tcPr/>
+                </a:tc>
+                <a:tc>
+                  <a:txBody>
+                    <a:bodyPr/>
+                    <a:lstStyle/>
+                    <a:p>
+                      <a:pPr algn="ctr"/>
+                      <a:r>
+                        <a:rPr lang="en-US" dirty="0"/>
+                        <a:t>57.7</a:t>
+                      </a:r>
+                    </a:p>
+                  </a:txBody>
+                  <a:tcPr/>
+                </a:tc>
+                <a:extLst>
+                  <a:ext uri="{0D108BD9-81ED-4DB2-BD59-A6C34878D82A}">
+                    <a16:rowId xmlns:a16="http://schemas.microsoft.com/office/drawing/2014/main" val="4278054734"/>
+                  </a:ext>
+                </a:extLst>
+              </a:tr>
+              <a:tr h="370840">
+                <a:tc>
+                  <a:txBody>
+                    <a:bodyPr/>
+                    <a:lstStyle/>
+                    <a:p>
+                      <a:r>
+                        <a:rPr lang="en-US" dirty="0" err="1"/>
+                        <a:t>RandomForest</a:t>
+                      </a:r>
+                      <a:endParaRPr lang="en-US" dirty="0"/>
+                    </a:p>
+                  </a:txBody>
+                  <a:tcPr/>
+                </a:tc>
+                <a:tc>
+                  <a:txBody>
+                    <a:bodyPr/>
+                    <a:lstStyle/>
+                    <a:p>
+                      <a:pPr algn="ctr"/>
+                      <a:r>
+                        <a:rPr lang="en-US" dirty="0"/>
+                        <a:t>47.5</a:t>
+                      </a:r>
+                    </a:p>
+                  </a:txBody>
+                  <a:tcPr/>
+                </a:tc>
+                <a:tc>
+                  <a:txBody>
+                    <a:bodyPr/>
+                    <a:lstStyle/>
+                    <a:p>
+                      <a:pPr algn="ctr"/>
+                      <a:r>
+                        <a:rPr lang="en-US" dirty="0"/>
+                        <a:t>50.1</a:t>
+                      </a:r>
+                    </a:p>
+                  </a:txBody>
+                  <a:tcPr/>
+                </a:tc>
+                <a:tc>
+                  <a:txBody>
+                    <a:bodyPr/>
+                    <a:lstStyle/>
+                    <a:p>
+                      <a:pPr algn="ctr"/>
+                      <a:r>
+                        <a:rPr lang="en-US" dirty="0"/>
+                        <a:t>36.4</a:t>
+                      </a:r>
+                    </a:p>
+                  </a:txBody>
+                  <a:tcPr/>
+                </a:tc>
+                <a:tc>
+                  <a:txBody>
+                    <a:bodyPr/>
+                    <a:lstStyle/>
+                    <a:p>
+                      <a:pPr algn="ctr"/>
+                      <a:r>
+                        <a:rPr lang="en-US" dirty="0"/>
+                        <a:t>76.3</a:t>
+                      </a:r>
+                    </a:p>
+                  </a:txBody>
+                  <a:tcPr/>
+                </a:tc>
+                <a:tc>
+                  <a:txBody>
+                    <a:bodyPr/>
+                    <a:lstStyle/>
+                    <a:p>
+                      <a:pPr algn="ctr"/>
+                      <a:r>
+                        <a:rPr lang="en-US" dirty="0"/>
+                        <a:t>50.1</a:t>
+                      </a:r>
+                    </a:p>
+                  </a:txBody>
+                  <a:tcPr/>
+                </a:tc>
+                <a:extLst>
+                  <a:ext uri="{0D108BD9-81ED-4DB2-BD59-A6C34878D82A}">
+                    <a16:rowId xmlns:a16="http://schemas.microsoft.com/office/drawing/2014/main" val="729158528"/>
+                  </a:ext>
+                </a:extLst>
+              </a:tr>
+              <a:tr h="370840">
+                <a:tc>
+                  <a:txBody>
+                    <a:bodyPr/>
+                    <a:lstStyle/>
+                    <a:p>
+                      <a:r>
+                        <a:rPr lang="en-US" dirty="0" err="1"/>
+                        <a:t>LinearSVC</a:t>
+                      </a:r>
+                      <a:endParaRPr lang="en-US" dirty="0"/>
+                    </a:p>
+                  </a:txBody>
+                  <a:tcPr/>
+                </a:tc>
+                <a:tc>
+                  <a:txBody>
+                    <a:bodyPr/>
+                    <a:lstStyle/>
+                    <a:p>
+                      <a:pPr algn="ctr"/>
+                      <a:r>
+                        <a:rPr lang="en-US" dirty="0">
+                          <a:solidFill>
+                            <a:srgbClr val="FF0000"/>
+                          </a:solidFill>
+                        </a:rPr>
+                        <a:t>55.3</a:t>
+                      </a:r>
+                    </a:p>
+                  </a:txBody>
+                  <a:tcPr/>
+                </a:tc>
+                <a:tc>
+                  <a:txBody>
+                    <a:bodyPr/>
+                    <a:lstStyle/>
+                    <a:p>
+                      <a:pPr algn="ctr"/>
+                      <a:r>
+                        <a:rPr lang="en-US" dirty="0">
+                          <a:solidFill>
+                            <a:srgbClr val="FF0000"/>
+                          </a:solidFill>
+                        </a:rPr>
+                        <a:t>60.3</a:t>
+                      </a:r>
+                    </a:p>
+                  </a:txBody>
+                  <a:tcPr/>
+                </a:tc>
+                <a:tc>
+                  <a:txBody>
+                    <a:bodyPr/>
+                    <a:lstStyle/>
+                    <a:p>
+                      <a:pPr algn="ctr"/>
+                      <a:r>
+                        <a:rPr lang="en-US" dirty="0">
+                          <a:solidFill>
+                            <a:srgbClr val="FF0000"/>
+                          </a:solidFill>
+                        </a:rPr>
+                        <a:t>51.2</a:t>
+                      </a:r>
+                    </a:p>
+                  </a:txBody>
+                  <a:tcPr/>
+                </a:tc>
+                <a:tc>
+                  <a:txBody>
+                    <a:bodyPr/>
+                    <a:lstStyle/>
+                    <a:p>
+                      <a:pPr algn="ctr"/>
+                      <a:r>
+                        <a:rPr lang="en-US" dirty="0">
+                          <a:solidFill>
+                            <a:srgbClr val="FF0000"/>
+                          </a:solidFill>
+                        </a:rPr>
+                        <a:t>80.4</a:t>
+                      </a:r>
+                    </a:p>
+                  </a:txBody>
+                  <a:tcPr/>
+                </a:tc>
+                <a:tc>
+                  <a:txBody>
+                    <a:bodyPr/>
+                    <a:lstStyle/>
+                    <a:p>
+                      <a:pPr algn="ctr"/>
+                      <a:r>
+                        <a:rPr lang="en-US" dirty="0">
+                          <a:solidFill>
+                            <a:srgbClr val="FF0000"/>
+                          </a:solidFill>
+                        </a:rPr>
+                        <a:t>60.3</a:t>
+                      </a:r>
+                    </a:p>
+                  </a:txBody>
+                  <a:tcPr/>
+                </a:tc>
+                <a:extLst>
+                  <a:ext uri="{0D108BD9-81ED-4DB2-BD59-A6C34878D82A}">
+                    <a16:rowId xmlns:a16="http://schemas.microsoft.com/office/drawing/2014/main" val="433948239"/>
+                  </a:ext>
+                </a:extLst>
+              </a:tr>
+              <a:tr h="370840">
+                <a:tc>
+                  <a:txBody>
+                    <a:bodyPr/>
+                    <a:lstStyle/>
+                    <a:p>
+                      <a:r>
+                        <a:rPr lang="en-US" dirty="0" err="1"/>
+                        <a:t>GBoosting</a:t>
+                      </a:r>
+                      <a:endParaRPr lang="en-US" dirty="0"/>
+                    </a:p>
+                  </a:txBody>
+                  <a:tcPr/>
+                </a:tc>
+                <a:tc>
+                  <a:txBody>
+                    <a:bodyPr/>
+                    <a:lstStyle/>
+                    <a:p>
+                      <a:pPr algn="ctr"/>
+                      <a:r>
+                        <a:rPr lang="en-US" dirty="0"/>
+                        <a:t>49.3</a:t>
+                      </a:r>
+                    </a:p>
+                  </a:txBody>
+                  <a:tcPr/>
+                </a:tc>
+                <a:tc>
+                  <a:txBody>
+                    <a:bodyPr/>
+                    <a:lstStyle/>
+                    <a:p>
+                      <a:pPr algn="ctr"/>
+                      <a:r>
+                        <a:rPr lang="en-US" dirty="0"/>
+                        <a:t>53.0</a:t>
+                      </a:r>
+                    </a:p>
+                  </a:txBody>
+                  <a:tcPr/>
+                </a:tc>
+                <a:tc>
+                  <a:txBody>
+                    <a:bodyPr/>
+                    <a:lstStyle/>
+                    <a:p>
+                      <a:pPr algn="ctr"/>
+                      <a:r>
+                        <a:rPr lang="en-US" dirty="0"/>
+                        <a:t>41.3</a:t>
+                      </a:r>
+                    </a:p>
+                  </a:txBody>
+                  <a:tcPr/>
+                </a:tc>
+                <a:tc>
+                  <a:txBody>
+                    <a:bodyPr/>
+                    <a:lstStyle/>
+                    <a:p>
+                      <a:pPr algn="ctr"/>
+                      <a:r>
+                        <a:rPr lang="en-US" dirty="0"/>
+                        <a:t>75.9</a:t>
+                      </a:r>
+                    </a:p>
+                  </a:txBody>
+                  <a:tcPr/>
+                </a:tc>
+                <a:tc>
+                  <a:txBody>
+                    <a:bodyPr/>
+                    <a:lstStyle/>
+                    <a:p>
+                      <a:pPr algn="ctr"/>
+                      <a:r>
+                        <a:rPr lang="en-US" dirty="0"/>
+                        <a:t>53.0</a:t>
+                      </a:r>
+                    </a:p>
+                  </a:txBody>
+                  <a:tcPr/>
+                </a:tc>
+                <a:extLst>
+                  <a:ext uri="{0D108BD9-81ED-4DB2-BD59-A6C34878D82A}">
+                    <a16:rowId xmlns:a16="http://schemas.microsoft.com/office/drawing/2014/main" val="210600965"/>
+                  </a:ext>
+                </a:extLst>
+              </a:tr>
+            </a:tbl>
+          </a:graphicData>
+        </a:graphic>
+      </p:graphicFrame>
+      <p:sp>
+        <p:nvSpPr>
+          <p:cNvPr id="13" name="Rectangle 12">
+            <a:extLst>
+              <a:ext uri="{FF2B5EF4-FFF2-40B4-BE49-F238E27FC236}">
+                <a16:creationId xmlns:a16="http://schemas.microsoft.com/office/drawing/2014/main" id="{BD426B31-7AE7-4907-9BFA-595952AEDAF1}"/>
+              </a:ext>
+            </a:extLst>
+          </p:cNvPr>
+          <p:cNvSpPr/>
           <p:nvPr/>
-        </p:nvPicPr>
-        <p:blipFill>
-          <a:blip r:embed="rId3"/>
-          <a:stretch>
-            <a:fillRect/>
-          </a:stretch>
-        </p:blipFill>
+        </p:nvSpPr>
         <p:spPr>
           <a:xfrm>
-            <a:off x="6542765" y="1548458"/>
-            <a:ext cx="4577116" cy="2083451"/>
+            <a:off x="427427" y="3906271"/>
+            <a:ext cx="1829347" cy="400110"/>
           </a:xfrm>
           <a:prstGeom prst="rect">
             <a:avLst/>
           </a:prstGeom>
+          <a:noFill/>
         </p:spPr>
-      </p:pic>
-      <p:pic>
-        <p:nvPicPr>
-          <p:cNvPr id="9" name="Picture 8">
-            <a:extLst>
-              <a:ext uri="{FF2B5EF4-FFF2-40B4-BE49-F238E27FC236}">
-                <a16:creationId xmlns:a16="http://schemas.microsoft.com/office/drawing/2014/main" id="{4FFF3B5A-21D7-4B66-BAA0-38C7CE3FF787}"/>
-              </a:ext>
-            </a:extLst>
-          </p:cNvPr>
-          <p:cNvPicPr>
-            <a:picLocks noChangeAspect="1"/>
-          </p:cNvPicPr>
-          <p:nvPr/>
-        </p:nvPicPr>
-        <p:blipFill>
-          <a:blip r:embed="rId4"/>
-          <a:stretch>
-            <a:fillRect/>
-          </a:stretch>
-        </p:blipFill>
-        <p:spPr>
-          <a:xfrm>
-            <a:off x="6334811" y="3924121"/>
-            <a:ext cx="5336753" cy="2083451"/>
-          </a:xfrm>
-          <a:prstGeom prst="rect">
-            <a:avLst/>
-          </a:prstGeom>
-        </p:spPr>
-      </p:pic>
+        <p:txBody>
+          <a:bodyPr wrap="square" lIns="91440" tIns="45720" rIns="91440" bIns="45720">
+            <a:spAutoFit/>
+          </a:bodyPr>
+          <a:lstStyle/>
+          <a:p>
+            <a:pPr algn="ctr"/>
+            <a:r>
+              <a:rPr lang="en-US" sz="2000" dirty="0" err="1">
+                <a:ln w="0"/>
+                <a:effectLst>
+                  <a:outerShdw blurRad="38100" dist="19050" dir="2700000" algn="tl" rotWithShape="0">
+                    <a:schemeClr val="dk1">
+                      <a:alpha val="40000"/>
+                    </a:schemeClr>
+                  </a:outerShdw>
+                </a:effectLst>
+              </a:rPr>
+              <a:t>FactRuEval</a:t>
+            </a:r>
+            <a:endParaRPr lang="en-US" sz="2000" b="0" cap="none" spc="0" dirty="0">
+              <a:ln w="0"/>
+              <a:solidFill>
+                <a:schemeClr val="tx1"/>
+              </a:solidFill>
+              <a:effectLst>
+                <a:outerShdw blurRad="38100" dist="19050" dir="2700000" algn="tl" rotWithShape="0">
+                  <a:schemeClr val="dk1">
+                    <a:alpha val="40000"/>
+                  </a:schemeClr>
+                </a:outerShdw>
+              </a:effectLst>
+            </a:endParaRPr>
+          </a:p>
+        </p:txBody>
+      </p:sp>
     </p:spTree>
     <p:extLst>
       <p:ext uri="{BB962C8B-B14F-4D97-AF65-F5344CB8AC3E}">
-        <p14:creationId xmlns:p14="http://schemas.microsoft.com/office/powerpoint/2010/main" val="734207749"/>
+        <p14:creationId xmlns:p14="http://schemas.microsoft.com/office/powerpoint/2010/main" val="1104778280"/>
       </p:ext>
     </p:extLst>
   </p:cSld>

</xml_diff>